<commit_message>
Präsentation - Teil von Maxi
</commit_message>
<xml_diff>
--- a/dokumentation/Kivy Präsi.pptx
+++ b/dokumentation/Kivy Präsi.pptx
@@ -5,14 +5,18 @@
     <p:sldMasterId id="2147483690" r:id="rId1"/>
   </p:sldMasterIdLst>
   <p:sldIdLst>
-    <p:sldId id="256" r:id="rId2"/>
-    <p:sldId id="257" r:id="rId3"/>
-    <p:sldId id="260" r:id="rId4"/>
-    <p:sldId id="259" r:id="rId5"/>
-    <p:sldId id="262" r:id="rId6"/>
-    <p:sldId id="264" r:id="rId7"/>
-    <p:sldId id="263" r:id="rId8"/>
-    <p:sldId id="265" r:id="rId9"/>
+    <p:sldId id="268" r:id="rId2"/>
+    <p:sldId id="269" r:id="rId3"/>
+    <p:sldId id="256" r:id="rId4"/>
+    <p:sldId id="257" r:id="rId5"/>
+    <p:sldId id="260" r:id="rId6"/>
+    <p:sldId id="259" r:id="rId7"/>
+    <p:sldId id="262" r:id="rId8"/>
+    <p:sldId id="266" r:id="rId9"/>
+    <p:sldId id="264" r:id="rId10"/>
+    <p:sldId id="263" r:id="rId11"/>
+    <p:sldId id="265" r:id="rId12"/>
+    <p:sldId id="267" r:id="rId13"/>
   </p:sldIdLst>
   <p:sldSz cx="12192000" cy="6858000"/>
   <p:notesSz cx="6858000" cy="9144000"/>
@@ -3384,7 +3388,7 @@
           <p:cNvPr id="2" name="Titel 1">
             <a:extLst>
               <a:ext uri="{FF2B5EF4-FFF2-40B4-BE49-F238E27FC236}">
-                <a16:creationId xmlns:a16="http://schemas.microsoft.com/office/drawing/2014/main" id="{17C75D57-F49E-2D4A-92B6-3F4E8598A629}"/>
+                <a16:creationId xmlns:a16="http://schemas.microsoft.com/office/drawing/2014/main" id="{532FA656-CEC6-DC5D-8745-4CD6E6D0BFDA}"/>
               </a:ext>
             </a:extLst>
           </p:cNvPr>
@@ -3392,7 +3396,7 @@
             <a:spLocks noGrp="1"/>
           </p:cNvSpPr>
           <p:nvPr>
-            <p:ph type="ctrTitle"/>
+            <p:ph type="title"/>
           </p:nvPr>
         </p:nvSpPr>
         <p:spPr/>
@@ -3401,50 +3405,86 @@
           <a:lstStyle/>
           <a:p>
             <a:r>
-              <a:rPr lang="de-DE" dirty="0" err="1"/>
-              <a:t>Kivy</a:t>
-            </a:r>
-            <a:r>
               <a:rPr lang="de-DE" dirty="0"/>
-              <a:t> Projekt</a:t>
-            </a:r>
-            <a:endParaRPr lang="LID4096" dirty="0"/>
-          </a:p>
-        </p:txBody>
-      </p:sp>
-      <p:sp>
-        <p:nvSpPr>
-          <p:cNvPr id="3" name="Untertitel 2">
+              <a:t>Das ist Hans</a:t>
+            </a:r>
+          </a:p>
+        </p:txBody>
+      </p:sp>
+      <p:pic>
+        <p:nvPicPr>
+          <p:cNvPr id="5" name="Grafik 4">
             <a:extLst>
               <a:ext uri="{FF2B5EF4-FFF2-40B4-BE49-F238E27FC236}">
-                <a16:creationId xmlns:a16="http://schemas.microsoft.com/office/drawing/2014/main" id="{1DF6C7AE-7191-ADB6-CBBB-0136D5692263}"/>
+                <a16:creationId xmlns:a16="http://schemas.microsoft.com/office/drawing/2014/main" id="{577A3B2A-9845-086F-445E-EAC6B742176C}"/>
               </a:ext>
             </a:extLst>
           </p:cNvPr>
-          <p:cNvSpPr>
-            <a:spLocks noGrp="1"/>
-          </p:cNvSpPr>
-          <p:nvPr>
-            <p:ph type="subTitle" idx="1"/>
-          </p:nvPr>
-        </p:nvSpPr>
-        <p:spPr/>
-        <p:txBody>
-          <a:bodyPr/>
-          <a:lstStyle/>
-          <a:p>
-            <a:r>
-              <a:rPr lang="de-DE" dirty="0"/>
-              <a:t>Eric, Maxi, Elias</a:t>
-            </a:r>
-            <a:endParaRPr lang="LID4096" dirty="0"/>
-          </a:p>
-        </p:txBody>
-      </p:sp>
+          <p:cNvPicPr>
+            <a:picLocks noChangeAspect="1"/>
+          </p:cNvPicPr>
+          <p:nvPr/>
+        </p:nvPicPr>
+        <p:blipFill>
+          <a:blip r:embed="rId2"/>
+          <a:stretch>
+            <a:fillRect/>
+          </a:stretch>
+        </p:blipFill>
+        <p:spPr>
+          <a:xfrm>
+            <a:off x="3653866" y="1819373"/>
+            <a:ext cx="4884268" cy="4614420"/>
+          </a:xfrm>
+          <a:prstGeom prst="rect">
+            <a:avLst/>
+          </a:prstGeom>
+        </p:spPr>
+      </p:pic>
+      <p:pic>
+        <p:nvPicPr>
+          <p:cNvPr id="6" name="Grafik 5">
+            <a:extLst>
+              <a:ext uri="{FF2B5EF4-FFF2-40B4-BE49-F238E27FC236}">
+                <a16:creationId xmlns:a16="http://schemas.microsoft.com/office/drawing/2014/main" id="{7109A208-0993-96BA-0564-4EA993E7F8A0}"/>
+              </a:ext>
+            </a:extLst>
+          </p:cNvPr>
+          <p:cNvPicPr>
+            <a:picLocks noChangeAspect="1"/>
+          </p:cNvPicPr>
+          <p:nvPr/>
+        </p:nvPicPr>
+        <p:blipFill>
+          <a:blip r:embed="rId2"/>
+          <a:stretch>
+            <a:fillRect/>
+          </a:stretch>
+        </p:blipFill>
+        <p:spPr>
+          <a:xfrm>
+            <a:off x="3653866" y="1734532"/>
+            <a:ext cx="4884268" cy="4614420"/>
+          </a:xfrm>
+          <a:prstGeom prst="rect">
+            <a:avLst/>
+          </a:prstGeom>
+          <a:ln>
+            <a:noFill/>
+          </a:ln>
+          <a:effectLst>
+            <a:outerShdw blurRad="190500" algn="tl" rotWithShape="0">
+              <a:srgbClr val="000000">
+                <a:alpha val="70000"/>
+              </a:srgbClr>
+            </a:outerShdw>
+          </a:effectLst>
+        </p:spPr>
+      </p:pic>
     </p:spTree>
     <p:extLst>
       <p:ext uri="{BB962C8B-B14F-4D97-AF65-F5344CB8AC3E}">
-        <p14:creationId xmlns:p14="http://schemas.microsoft.com/office/powerpoint/2010/main" val="3637561198"/>
+        <p14:creationId xmlns:p14="http://schemas.microsoft.com/office/powerpoint/2010/main" val="2412611035"/>
       </p:ext>
     </p:extLst>
   </p:cSld>
@@ -3454,7 +3494,7 @@
 </p:sld>
 </file>
 
-<file path=ppt/slides/slide2.xml><?xml version="1.0" encoding="utf-8"?>
+<file path=ppt/slides/slide10.xml><?xml version="1.0" encoding="utf-8"?>
 <p:sld xmlns:a="http://schemas.openxmlformats.org/drawingml/2006/main" xmlns:r="http://schemas.openxmlformats.org/officeDocument/2006/relationships" xmlns:p="http://schemas.openxmlformats.org/presentationml/2006/main">
   <p:cSld>
     <p:spTree>
@@ -3476,568 +3516,6 @@
           <p:cNvPr id="2" name="Titel 1">
             <a:extLst>
               <a:ext uri="{FF2B5EF4-FFF2-40B4-BE49-F238E27FC236}">
-                <a16:creationId xmlns:a16="http://schemas.microsoft.com/office/drawing/2014/main" id="{2D0E87ED-6989-CE3B-7FDF-EBE3D11CCD85}"/>
-              </a:ext>
-            </a:extLst>
-          </p:cNvPr>
-          <p:cNvSpPr>
-            <a:spLocks noGrp="1"/>
-          </p:cNvSpPr>
-          <p:nvPr>
-            <p:ph type="title"/>
-          </p:nvPr>
-        </p:nvSpPr>
-        <p:spPr/>
-        <p:txBody>
-          <a:bodyPr/>
-          <a:lstStyle/>
-          <a:p>
-            <a:r>
-              <a:rPr lang="de-DE" dirty="0"/>
-              <a:t>Was ist unser Projekt Thema?</a:t>
-            </a:r>
-            <a:endParaRPr lang="LID4096" dirty="0"/>
-          </a:p>
-        </p:txBody>
-      </p:sp>
-      <p:sp>
-        <p:nvSpPr>
-          <p:cNvPr id="3" name="Inhaltsplatzhalter 2">
-            <a:extLst>
-              <a:ext uri="{FF2B5EF4-FFF2-40B4-BE49-F238E27FC236}">
-                <a16:creationId xmlns:a16="http://schemas.microsoft.com/office/drawing/2014/main" id="{D6540878-2B96-7F2A-8BB6-A7C25C296320}"/>
-              </a:ext>
-            </a:extLst>
-          </p:cNvPr>
-          <p:cNvSpPr>
-            <a:spLocks noGrp="1"/>
-          </p:cNvSpPr>
-          <p:nvPr>
-            <p:ph idx="1"/>
-          </p:nvPr>
-        </p:nvSpPr>
-        <p:spPr/>
-        <p:txBody>
-          <a:bodyPr/>
-          <a:lstStyle/>
-          <a:p>
-            <a:endParaRPr lang="LID4096"/>
-          </a:p>
-        </p:txBody>
-      </p:sp>
-    </p:spTree>
-    <p:extLst>
-      <p:ext uri="{BB962C8B-B14F-4D97-AF65-F5344CB8AC3E}">
-        <p14:creationId xmlns:p14="http://schemas.microsoft.com/office/powerpoint/2010/main" val="628617651"/>
-      </p:ext>
-    </p:extLst>
-  </p:cSld>
-  <p:clrMapOvr>
-    <a:masterClrMapping/>
-  </p:clrMapOvr>
-</p:sld>
-</file>
-
-<file path=ppt/slides/slide3.xml><?xml version="1.0" encoding="utf-8"?>
-<p:sld xmlns:a="http://schemas.openxmlformats.org/drawingml/2006/main" xmlns:r="http://schemas.openxmlformats.org/officeDocument/2006/relationships" xmlns:p="http://schemas.openxmlformats.org/presentationml/2006/main">
-  <p:cSld>
-    <p:spTree>
-      <p:nvGrpSpPr>
-        <p:cNvPr id="1" name=""/>
-        <p:cNvGrpSpPr/>
-        <p:nvPr/>
-      </p:nvGrpSpPr>
-      <p:grpSpPr>
-        <a:xfrm>
-          <a:off x="0" y="0"/>
-          <a:ext cx="0" cy="0"/>
-          <a:chOff x="0" y="0"/>
-          <a:chExt cx="0" cy="0"/>
-        </a:xfrm>
-      </p:grpSpPr>
-      <p:sp>
-        <p:nvSpPr>
-          <p:cNvPr id="2" name="Titel 1">
-            <a:extLst>
-              <a:ext uri="{FF2B5EF4-FFF2-40B4-BE49-F238E27FC236}">
-                <a16:creationId xmlns:a16="http://schemas.microsoft.com/office/drawing/2014/main" id="{1803113C-B0D2-B232-68D9-5A6CD0F053F4}"/>
-              </a:ext>
-            </a:extLst>
-          </p:cNvPr>
-          <p:cNvSpPr>
-            <a:spLocks noGrp="1"/>
-          </p:cNvSpPr>
-          <p:nvPr>
-            <p:ph type="title"/>
-          </p:nvPr>
-        </p:nvSpPr>
-        <p:spPr/>
-        <p:txBody>
-          <a:bodyPr/>
-          <a:lstStyle/>
-          <a:p>
-            <a:r>
-              <a:rPr lang="de-DE" dirty="0"/>
-              <a:t>Eric</a:t>
-            </a:r>
-            <a:endParaRPr lang="LID4096" dirty="0"/>
-          </a:p>
-        </p:txBody>
-      </p:sp>
-      <p:sp>
-        <p:nvSpPr>
-          <p:cNvPr id="3" name="Inhaltsplatzhalter 2">
-            <a:extLst>
-              <a:ext uri="{FF2B5EF4-FFF2-40B4-BE49-F238E27FC236}">
-                <a16:creationId xmlns:a16="http://schemas.microsoft.com/office/drawing/2014/main" id="{689696B5-9623-F55B-65D9-CE7D126F230F}"/>
-              </a:ext>
-            </a:extLst>
-          </p:cNvPr>
-          <p:cNvSpPr>
-            <a:spLocks noGrp="1"/>
-          </p:cNvSpPr>
-          <p:nvPr>
-            <p:ph idx="1"/>
-          </p:nvPr>
-        </p:nvSpPr>
-        <p:spPr/>
-        <p:txBody>
-          <a:bodyPr/>
-          <a:lstStyle/>
-          <a:p>
-            <a:r>
-              <a:rPr lang="de-DE" dirty="0" err="1"/>
-              <a:t>Layout.kv</a:t>
-            </a:r>
-            <a:r>
-              <a:rPr lang="de-DE" dirty="0"/>
-              <a:t> erklären -Eric-</a:t>
-            </a:r>
-            <a:endParaRPr lang="LID4096" dirty="0"/>
-          </a:p>
-        </p:txBody>
-      </p:sp>
-    </p:spTree>
-    <p:extLst>
-      <p:ext uri="{BB962C8B-B14F-4D97-AF65-F5344CB8AC3E}">
-        <p14:creationId xmlns:p14="http://schemas.microsoft.com/office/powerpoint/2010/main" val="1223572070"/>
-      </p:ext>
-    </p:extLst>
-  </p:cSld>
-  <p:clrMapOvr>
-    <a:masterClrMapping/>
-  </p:clrMapOvr>
-</p:sld>
-</file>
-
-<file path=ppt/slides/slide4.xml><?xml version="1.0" encoding="utf-8"?>
-<p:sld xmlns:a="http://schemas.openxmlformats.org/drawingml/2006/main" xmlns:r="http://schemas.openxmlformats.org/officeDocument/2006/relationships" xmlns:p="http://schemas.openxmlformats.org/presentationml/2006/main">
-  <p:cSld>
-    <p:spTree>
-      <p:nvGrpSpPr>
-        <p:cNvPr id="1" name=""/>
-        <p:cNvGrpSpPr/>
-        <p:nvPr/>
-      </p:nvGrpSpPr>
-      <p:grpSpPr>
-        <a:xfrm>
-          <a:off x="0" y="0"/>
-          <a:ext cx="0" cy="0"/>
-          <a:chOff x="0" y="0"/>
-          <a:chExt cx="0" cy="0"/>
-        </a:xfrm>
-      </p:grpSpPr>
-      <p:sp>
-        <p:nvSpPr>
-          <p:cNvPr id="2" name="Titel 1">
-            <a:extLst>
-              <a:ext uri="{FF2B5EF4-FFF2-40B4-BE49-F238E27FC236}">
-                <a16:creationId xmlns:a16="http://schemas.microsoft.com/office/drawing/2014/main" id="{A32ADBC9-4189-536E-CBCA-214F2AE2F9F2}"/>
-              </a:ext>
-            </a:extLst>
-          </p:cNvPr>
-          <p:cNvSpPr>
-            <a:spLocks noGrp="1"/>
-          </p:cNvSpPr>
-          <p:nvPr>
-            <p:ph type="title"/>
-          </p:nvPr>
-        </p:nvSpPr>
-        <p:spPr>
-          <a:xfrm>
-            <a:off x="2742709" y="201336"/>
-            <a:ext cx="6706579" cy="959281"/>
-          </a:xfrm>
-        </p:spPr>
-        <p:txBody>
-          <a:bodyPr/>
-          <a:lstStyle/>
-          <a:p>
-            <a:r>
-              <a:rPr lang="de-DE" dirty="0"/>
-              <a:t>Lösungsansatz MQTT</a:t>
-            </a:r>
-            <a:endParaRPr lang="LID4096" dirty="0"/>
-          </a:p>
-        </p:txBody>
-      </p:sp>
-      <p:pic>
-        <p:nvPicPr>
-          <p:cNvPr id="13" name="Grafik 12">
-            <a:extLst>
-              <a:ext uri="{FF2B5EF4-FFF2-40B4-BE49-F238E27FC236}">
-                <a16:creationId xmlns:a16="http://schemas.microsoft.com/office/drawing/2014/main" id="{64E849AB-E85A-8FCE-CA2E-13F6241A44F5}"/>
-              </a:ext>
-            </a:extLst>
-          </p:cNvPr>
-          <p:cNvPicPr>
-            <a:picLocks noChangeAspect="1"/>
-          </p:cNvPicPr>
-          <p:nvPr/>
-        </p:nvPicPr>
-        <p:blipFill>
-          <a:blip r:embed="rId2"/>
-          <a:stretch>
-            <a:fillRect/>
-          </a:stretch>
-        </p:blipFill>
-        <p:spPr>
-          <a:xfrm>
-            <a:off x="937583" y="1326735"/>
-            <a:ext cx="2463927" cy="1771741"/>
-          </a:xfrm>
-          <a:prstGeom prst="rect">
-            <a:avLst/>
-          </a:prstGeom>
-        </p:spPr>
-      </p:pic>
-      <p:sp>
-        <p:nvSpPr>
-          <p:cNvPr id="16" name="Pfeil: nach rechts 15">
-            <a:extLst>
-              <a:ext uri="{FF2B5EF4-FFF2-40B4-BE49-F238E27FC236}">
-                <a16:creationId xmlns:a16="http://schemas.microsoft.com/office/drawing/2014/main" id="{D6F2C81F-B965-2E01-47D4-82E90157CD93}"/>
-              </a:ext>
-            </a:extLst>
-          </p:cNvPr>
-          <p:cNvSpPr/>
-          <p:nvPr/>
-        </p:nvSpPr>
-        <p:spPr>
-          <a:xfrm rot="18728639">
-            <a:off x="4130976" y="3587275"/>
-            <a:ext cx="627244" cy="528933"/>
-          </a:xfrm>
-          <a:prstGeom prst="rightArrow">
-            <a:avLst/>
-          </a:prstGeom>
-        </p:spPr>
-        <p:style>
-          <a:lnRef idx="2">
-            <a:schemeClr val="accent1">
-              <a:shade val="15000"/>
-            </a:schemeClr>
-          </a:lnRef>
-          <a:fillRef idx="1">
-            <a:schemeClr val="accent1"/>
-          </a:fillRef>
-          <a:effectRef idx="0">
-            <a:schemeClr val="accent1"/>
-          </a:effectRef>
-          <a:fontRef idx="minor">
-            <a:schemeClr val="lt1"/>
-          </a:fontRef>
-        </p:style>
-        <p:txBody>
-          <a:bodyPr rtlCol="0" anchor="ctr"/>
-          <a:lstStyle/>
-          <a:p>
-            <a:pPr algn="ctr"/>
-            <a:endParaRPr lang="LID4096"/>
-          </a:p>
-        </p:txBody>
-      </p:sp>
-      <p:pic>
-        <p:nvPicPr>
-          <p:cNvPr id="18" name="Grafik 17">
-            <a:extLst>
-              <a:ext uri="{FF2B5EF4-FFF2-40B4-BE49-F238E27FC236}">
-                <a16:creationId xmlns:a16="http://schemas.microsoft.com/office/drawing/2014/main" id="{ADAD9063-3050-F634-880E-AFACF127AE79}"/>
-              </a:ext>
-            </a:extLst>
-          </p:cNvPr>
-          <p:cNvPicPr>
-            <a:picLocks noChangeAspect="1"/>
-          </p:cNvPicPr>
-          <p:nvPr/>
-        </p:nvPicPr>
-        <p:blipFill>
-          <a:blip r:embed="rId3"/>
-          <a:stretch>
-            <a:fillRect/>
-          </a:stretch>
-        </p:blipFill>
-        <p:spPr>
-          <a:xfrm>
-            <a:off x="665171" y="4427854"/>
-            <a:ext cx="3503674" cy="1771741"/>
-          </a:xfrm>
-          <a:prstGeom prst="rect">
-            <a:avLst/>
-          </a:prstGeom>
-        </p:spPr>
-      </p:pic>
-      <p:sp>
-        <p:nvSpPr>
-          <p:cNvPr id="21" name="Pfeil: nach rechts 20">
-            <a:extLst>
-              <a:ext uri="{FF2B5EF4-FFF2-40B4-BE49-F238E27FC236}">
-                <a16:creationId xmlns:a16="http://schemas.microsoft.com/office/drawing/2014/main" id="{B4152211-0B79-184A-8627-DA56A13C5DA3}"/>
-              </a:ext>
-            </a:extLst>
-          </p:cNvPr>
-          <p:cNvSpPr/>
-          <p:nvPr/>
-        </p:nvSpPr>
-        <p:spPr>
-          <a:xfrm rot="5400000">
-            <a:off x="1970103" y="3415639"/>
-            <a:ext cx="614135" cy="528933"/>
-          </a:xfrm>
-          <a:prstGeom prst="rightArrow">
-            <a:avLst/>
-          </a:prstGeom>
-        </p:spPr>
-        <p:style>
-          <a:lnRef idx="2">
-            <a:schemeClr val="accent1">
-              <a:shade val="15000"/>
-            </a:schemeClr>
-          </a:lnRef>
-          <a:fillRef idx="1">
-            <a:schemeClr val="accent1"/>
-          </a:fillRef>
-          <a:effectRef idx="0">
-            <a:schemeClr val="accent1"/>
-          </a:effectRef>
-          <a:fontRef idx="minor">
-            <a:schemeClr val="lt1"/>
-          </a:fontRef>
-        </p:style>
-        <p:txBody>
-          <a:bodyPr rtlCol="0" anchor="ctr"/>
-          <a:lstStyle/>
-          <a:p>
-            <a:pPr algn="ctr"/>
-            <a:endParaRPr lang="LID4096" dirty="0"/>
-          </a:p>
-        </p:txBody>
-      </p:sp>
-      <p:pic>
-        <p:nvPicPr>
-          <p:cNvPr id="4" name="Grafik 3">
-            <a:extLst>
-              <a:ext uri="{FF2B5EF4-FFF2-40B4-BE49-F238E27FC236}">
-                <a16:creationId xmlns:a16="http://schemas.microsoft.com/office/drawing/2014/main" id="{6B35B3EC-A4B2-36A5-815E-5A4E934E2AE0}"/>
-              </a:ext>
-            </a:extLst>
-          </p:cNvPr>
-          <p:cNvPicPr>
-            <a:picLocks noChangeAspect="1"/>
-          </p:cNvPicPr>
-          <p:nvPr/>
-        </p:nvPicPr>
-        <p:blipFill>
-          <a:blip r:embed="rId4"/>
-          <a:stretch>
-            <a:fillRect/>
-          </a:stretch>
-        </p:blipFill>
-        <p:spPr>
-          <a:xfrm>
-            <a:off x="5206636" y="1139671"/>
-            <a:ext cx="6047781" cy="2400423"/>
-          </a:xfrm>
-          <a:prstGeom prst="rect">
-            <a:avLst/>
-          </a:prstGeom>
-        </p:spPr>
-      </p:pic>
-      <p:sp>
-        <p:nvSpPr>
-          <p:cNvPr id="7" name="Pfeil: nach rechts 6">
-            <a:extLst>
-              <a:ext uri="{FF2B5EF4-FFF2-40B4-BE49-F238E27FC236}">
-                <a16:creationId xmlns:a16="http://schemas.microsoft.com/office/drawing/2014/main" id="{C361B1F2-BE62-DA8C-5CA6-3E6D5A93CA4F}"/>
-              </a:ext>
-            </a:extLst>
-          </p:cNvPr>
-          <p:cNvSpPr/>
-          <p:nvPr/>
-        </p:nvSpPr>
-        <p:spPr>
-          <a:xfrm rot="5159067">
-            <a:off x="7820622" y="3898921"/>
-            <a:ext cx="409903" cy="528933"/>
-          </a:xfrm>
-          <a:prstGeom prst="rightArrow">
-            <a:avLst/>
-          </a:prstGeom>
-        </p:spPr>
-        <p:style>
-          <a:lnRef idx="2">
-            <a:schemeClr val="accent1">
-              <a:shade val="15000"/>
-            </a:schemeClr>
-          </a:lnRef>
-          <a:fillRef idx="1">
-            <a:schemeClr val="accent1"/>
-          </a:fillRef>
-          <a:effectRef idx="0">
-            <a:schemeClr val="accent1"/>
-          </a:effectRef>
-          <a:fontRef idx="minor">
-            <a:schemeClr val="lt1"/>
-          </a:fontRef>
-        </p:style>
-        <p:txBody>
-          <a:bodyPr rtlCol="0" anchor="ctr"/>
-          <a:lstStyle/>
-          <a:p>
-            <a:pPr algn="ctr"/>
-            <a:endParaRPr lang="LID4096"/>
-          </a:p>
-        </p:txBody>
-      </p:sp>
-      <p:pic>
-        <p:nvPicPr>
-          <p:cNvPr id="3" name="Grafik 2">
-            <a:extLst>
-              <a:ext uri="{FF2B5EF4-FFF2-40B4-BE49-F238E27FC236}">
-                <a16:creationId xmlns:a16="http://schemas.microsoft.com/office/drawing/2014/main" id="{67635E5E-6165-040C-42B5-CFAB807BA6E2}"/>
-              </a:ext>
-            </a:extLst>
-          </p:cNvPr>
-          <p:cNvPicPr>
-            <a:picLocks noChangeAspect="1"/>
-          </p:cNvPicPr>
-          <p:nvPr/>
-        </p:nvPicPr>
-        <p:blipFill>
-          <a:blip r:embed="rId5"/>
-          <a:stretch>
-            <a:fillRect/>
-          </a:stretch>
-        </p:blipFill>
-        <p:spPr>
-          <a:xfrm>
-            <a:off x="4798174" y="4692320"/>
-            <a:ext cx="6864703" cy="1663786"/>
-          </a:xfrm>
-          <a:prstGeom prst="rect">
-            <a:avLst/>
-          </a:prstGeom>
-        </p:spPr>
-      </p:pic>
-    </p:spTree>
-    <p:extLst>
-      <p:ext uri="{BB962C8B-B14F-4D97-AF65-F5344CB8AC3E}">
-        <p14:creationId xmlns:p14="http://schemas.microsoft.com/office/powerpoint/2010/main" val="749014029"/>
-      </p:ext>
-    </p:extLst>
-  </p:cSld>
-  <p:clrMapOvr>
-    <a:masterClrMapping/>
-  </p:clrMapOvr>
-</p:sld>
-</file>
-
-<file path=ppt/slides/slide5.xml><?xml version="1.0" encoding="utf-8"?>
-<p:sld xmlns:a="http://schemas.openxmlformats.org/drawingml/2006/main" xmlns:r="http://schemas.openxmlformats.org/officeDocument/2006/relationships" xmlns:p="http://schemas.openxmlformats.org/presentationml/2006/main">
-  <p:cSld>
-    <p:spTree>
-      <p:nvGrpSpPr>
-        <p:cNvPr id="1" name=""/>
-        <p:cNvGrpSpPr/>
-        <p:nvPr/>
-      </p:nvGrpSpPr>
-      <p:grpSpPr>
-        <a:xfrm>
-          <a:off x="0" y="0"/>
-          <a:ext cx="0" cy="0"/>
-          <a:chOff x="0" y="0"/>
-          <a:chExt cx="0" cy="0"/>
-        </a:xfrm>
-      </p:grpSpPr>
-      <p:sp>
-        <p:nvSpPr>
-          <p:cNvPr id="2" name="Titel 1">
-            <a:extLst>
-              <a:ext uri="{FF2B5EF4-FFF2-40B4-BE49-F238E27FC236}">
-                <a16:creationId xmlns:a16="http://schemas.microsoft.com/office/drawing/2014/main" id="{3A90885E-398E-BE38-AD53-8C04EB50DCE1}"/>
-              </a:ext>
-            </a:extLst>
-          </p:cNvPr>
-          <p:cNvSpPr>
-            <a:spLocks noGrp="1"/>
-          </p:cNvSpPr>
-          <p:nvPr>
-            <p:ph type="title"/>
-          </p:nvPr>
-        </p:nvSpPr>
-        <p:spPr>
-          <a:xfrm>
-            <a:off x="1158240" y="2750820"/>
-            <a:ext cx="9875520" cy="1356360"/>
-          </a:xfrm>
-        </p:spPr>
-        <p:txBody>
-          <a:bodyPr/>
-          <a:lstStyle/>
-          <a:p>
-            <a:pPr algn="ctr"/>
-            <a:r>
-              <a:rPr lang="de-DE" dirty="0"/>
-              <a:t>Umgang mit den lokalen Daten</a:t>
-            </a:r>
-          </a:p>
-        </p:txBody>
-      </p:sp>
-    </p:spTree>
-    <p:extLst>
-      <p:ext uri="{BB962C8B-B14F-4D97-AF65-F5344CB8AC3E}">
-        <p14:creationId xmlns:p14="http://schemas.microsoft.com/office/powerpoint/2010/main" val="4132764493"/>
-      </p:ext>
-    </p:extLst>
-  </p:cSld>
-  <p:clrMapOvr>
-    <a:masterClrMapping/>
-  </p:clrMapOvr>
-</p:sld>
-</file>
-
-<file path=ppt/slides/slide6.xml><?xml version="1.0" encoding="utf-8"?>
-<p:sld xmlns:a="http://schemas.openxmlformats.org/drawingml/2006/main" xmlns:r="http://schemas.openxmlformats.org/officeDocument/2006/relationships" xmlns:p="http://schemas.openxmlformats.org/presentationml/2006/main">
-  <p:cSld>
-    <p:spTree>
-      <p:nvGrpSpPr>
-        <p:cNvPr id="1" name=""/>
-        <p:cNvGrpSpPr/>
-        <p:nvPr/>
-      </p:nvGrpSpPr>
-      <p:grpSpPr>
-        <a:xfrm>
-          <a:off x="0" y="0"/>
-          <a:ext cx="0" cy="0"/>
-          <a:chOff x="0" y="0"/>
-          <a:chExt cx="0" cy="0"/>
-        </a:xfrm>
-      </p:grpSpPr>
-      <p:sp>
-        <p:nvSpPr>
-          <p:cNvPr id="2" name="Titel 1">
-            <a:extLst>
-              <a:ext uri="{FF2B5EF4-FFF2-40B4-BE49-F238E27FC236}">
                 <a16:creationId xmlns:a16="http://schemas.microsoft.com/office/drawing/2014/main" id="{8D059D17-FC61-D6F1-AE82-A2A9AB66B645}"/>
               </a:ext>
             </a:extLst>
@@ -4056,876 +3534,7 @@
           <a:p>
             <a:r>
               <a:rPr lang="de-DE" dirty="0"/>
-              <a:t>Tasks</a:t>
-            </a:r>
-          </a:p>
-        </p:txBody>
-      </p:sp>
-      <p:sp>
-        <p:nvSpPr>
-          <p:cNvPr id="3" name="Textfeld 2">
-            <a:extLst>
-              <a:ext uri="{FF2B5EF4-FFF2-40B4-BE49-F238E27FC236}">
-                <a16:creationId xmlns:a16="http://schemas.microsoft.com/office/drawing/2014/main" id="{E2A9F9FC-B7EC-AEBF-552B-335B9719D0E5}"/>
-              </a:ext>
-            </a:extLst>
-          </p:cNvPr>
-          <p:cNvSpPr txBox="1"/>
-          <p:nvPr/>
-        </p:nvSpPr>
-        <p:spPr>
-          <a:xfrm>
-            <a:off x="1212980" y="1965960"/>
-            <a:ext cx="3555349" cy="369332"/>
-          </a:xfrm>
-          <a:prstGeom prst="rect">
-            <a:avLst/>
-          </a:prstGeom>
-          <a:noFill/>
-        </p:spPr>
-        <p:txBody>
-          <a:bodyPr wrap="square" rtlCol="0">
-            <a:spAutoFit/>
-          </a:bodyPr>
-          <a:lstStyle/>
-          <a:p>
-            <a:r>
-              <a:rPr lang="de-DE" dirty="0"/>
-              <a:t>Hinzufügen des Tasks</a:t>
-            </a:r>
-          </a:p>
-        </p:txBody>
-      </p:sp>
-      <p:sp>
-        <p:nvSpPr>
-          <p:cNvPr id="6" name="Textfeld 5">
-            <a:extLst>
-              <a:ext uri="{FF2B5EF4-FFF2-40B4-BE49-F238E27FC236}">
-                <a16:creationId xmlns:a16="http://schemas.microsoft.com/office/drawing/2014/main" id="{CE46F5E4-D754-5DAF-79EC-ADFBEA76B5AF}"/>
-              </a:ext>
-            </a:extLst>
-          </p:cNvPr>
-          <p:cNvSpPr txBox="1"/>
-          <p:nvPr/>
-        </p:nvSpPr>
-        <p:spPr>
-          <a:xfrm>
-            <a:off x="1212978" y="2758751"/>
-            <a:ext cx="3666931" cy="646331"/>
-          </a:xfrm>
-          <a:prstGeom prst="rect">
-            <a:avLst/>
-          </a:prstGeom>
-          <a:noFill/>
-        </p:spPr>
-        <p:txBody>
-          <a:bodyPr wrap="square" rtlCol="0">
-            <a:spAutoFit/>
-          </a:bodyPr>
-          <a:lstStyle/>
-          <a:p>
-            <a:r>
-              <a:rPr lang="de-DE" dirty="0"/>
-              <a:t>Öffnen der lokalen „</a:t>
-            </a:r>
-            <a:r>
-              <a:rPr lang="de-DE" dirty="0" err="1"/>
-              <a:t>tasks.json</a:t>
-            </a:r>
-            <a:r>
-              <a:rPr lang="de-DE" dirty="0"/>
-              <a:t>“</a:t>
-            </a:r>
-          </a:p>
-          <a:p>
-            <a:r>
-              <a:rPr lang="de-DE" dirty="0"/>
-              <a:t>&amp; als </a:t>
-            </a:r>
-            <a:r>
-              <a:rPr lang="de-DE" dirty="0" err="1"/>
-              <a:t>dict</a:t>
-            </a:r>
-            <a:r>
-              <a:rPr lang="de-DE" dirty="0"/>
-              <a:t> laden</a:t>
-            </a:r>
-          </a:p>
-        </p:txBody>
-      </p:sp>
-      <p:pic>
-        <p:nvPicPr>
-          <p:cNvPr id="10" name="Grafik 9">
-            <a:extLst>
-              <a:ext uri="{FF2B5EF4-FFF2-40B4-BE49-F238E27FC236}">
-                <a16:creationId xmlns:a16="http://schemas.microsoft.com/office/drawing/2014/main" id="{1D8903AA-ED21-1C77-C8E2-F3AB8BEA64AD}"/>
-              </a:ext>
-            </a:extLst>
-          </p:cNvPr>
-          <p:cNvPicPr>
-            <a:picLocks noChangeAspect="1"/>
-          </p:cNvPicPr>
-          <p:nvPr/>
-        </p:nvPicPr>
-        <p:blipFill rotWithShape="1">
-          <a:blip r:embed="rId2"/>
-          <a:srcRect t="1" b="88344"/>
-          <a:stretch/>
-        </p:blipFill>
-        <p:spPr>
-          <a:xfrm>
-            <a:off x="5015397" y="1965960"/>
-            <a:ext cx="6250191" cy="469641"/>
-          </a:xfrm>
-          <a:prstGeom prst="rect">
-            <a:avLst/>
-          </a:prstGeom>
-        </p:spPr>
-      </p:pic>
-      <p:pic>
-        <p:nvPicPr>
-          <p:cNvPr id="13" name="Grafik 12">
-            <a:extLst>
-              <a:ext uri="{FF2B5EF4-FFF2-40B4-BE49-F238E27FC236}">
-                <a16:creationId xmlns:a16="http://schemas.microsoft.com/office/drawing/2014/main" id="{25706AFD-14A3-14A9-9CAA-08FE42F4BB4B}"/>
-              </a:ext>
-            </a:extLst>
-          </p:cNvPr>
-          <p:cNvPicPr>
-            <a:picLocks noChangeAspect="1"/>
-          </p:cNvPicPr>
-          <p:nvPr/>
-        </p:nvPicPr>
-        <p:blipFill rotWithShape="1">
-          <a:blip r:embed="rId2"/>
-          <a:srcRect t="18285" b="70060"/>
-          <a:stretch/>
-        </p:blipFill>
-        <p:spPr>
-          <a:xfrm>
-            <a:off x="5015397" y="2758751"/>
-            <a:ext cx="6250191" cy="469641"/>
-          </a:xfrm>
-          <a:prstGeom prst="rect">
-            <a:avLst/>
-          </a:prstGeom>
-        </p:spPr>
-      </p:pic>
-      <p:pic>
-        <p:nvPicPr>
-          <p:cNvPr id="14" name="Grafik 13">
-            <a:extLst>
-              <a:ext uri="{FF2B5EF4-FFF2-40B4-BE49-F238E27FC236}">
-                <a16:creationId xmlns:a16="http://schemas.microsoft.com/office/drawing/2014/main" id="{14C163CB-D792-73E0-866F-8CABF2AE5305}"/>
-              </a:ext>
-            </a:extLst>
-          </p:cNvPr>
-          <p:cNvPicPr>
-            <a:picLocks noChangeAspect="1"/>
-          </p:cNvPicPr>
-          <p:nvPr/>
-        </p:nvPicPr>
-        <p:blipFill rotWithShape="1">
-          <a:blip r:embed="rId2"/>
-          <a:srcRect t="33661" b="34168"/>
-          <a:stretch/>
-        </p:blipFill>
-        <p:spPr>
-          <a:xfrm>
-            <a:off x="5015397" y="3322320"/>
-            <a:ext cx="6250191" cy="1296333"/>
-          </a:xfrm>
-          <a:prstGeom prst="rect">
-            <a:avLst/>
-          </a:prstGeom>
-        </p:spPr>
-      </p:pic>
-      <p:sp>
-        <p:nvSpPr>
-          <p:cNvPr id="16" name="Textfeld 15">
-            <a:extLst>
-              <a:ext uri="{FF2B5EF4-FFF2-40B4-BE49-F238E27FC236}">
-                <a16:creationId xmlns:a16="http://schemas.microsoft.com/office/drawing/2014/main" id="{82E5C6AB-2177-D1BD-B416-6CD0ED00C28F}"/>
-              </a:ext>
-            </a:extLst>
-          </p:cNvPr>
-          <p:cNvSpPr txBox="1"/>
-          <p:nvPr/>
-        </p:nvSpPr>
-        <p:spPr>
-          <a:xfrm>
-            <a:off x="1212978" y="3322320"/>
-            <a:ext cx="3666931" cy="369332"/>
-          </a:xfrm>
-          <a:prstGeom prst="rect">
-            <a:avLst/>
-          </a:prstGeom>
-          <a:noFill/>
-        </p:spPr>
-        <p:txBody>
-          <a:bodyPr wrap="square" rtlCol="0">
-            <a:spAutoFit/>
-          </a:bodyPr>
-          <a:lstStyle/>
-          <a:p>
-            <a:r>
-              <a:rPr lang="de-DE" dirty="0"/>
-              <a:t>Erstellen des Tasks Format</a:t>
-            </a:r>
-          </a:p>
-        </p:txBody>
-      </p:sp>
-      <p:pic>
-        <p:nvPicPr>
-          <p:cNvPr id="17" name="Grafik 16">
-            <a:extLst>
-              <a:ext uri="{FF2B5EF4-FFF2-40B4-BE49-F238E27FC236}">
-                <a16:creationId xmlns:a16="http://schemas.microsoft.com/office/drawing/2014/main" id="{D87921E2-CCA0-9B17-C1B2-15F8A535E109}"/>
-              </a:ext>
-            </a:extLst>
-          </p:cNvPr>
-          <p:cNvPicPr>
-            <a:picLocks noChangeAspect="1"/>
-          </p:cNvPicPr>
-          <p:nvPr/>
-        </p:nvPicPr>
-        <p:blipFill rotWithShape="1">
-          <a:blip r:embed="rId2"/>
-          <a:srcRect t="67635" b="15013"/>
-          <a:stretch/>
-        </p:blipFill>
-        <p:spPr>
-          <a:xfrm>
-            <a:off x="5015397" y="4712581"/>
-            <a:ext cx="6250191" cy="699174"/>
-          </a:xfrm>
-          <a:prstGeom prst="rect">
-            <a:avLst/>
-          </a:prstGeom>
-        </p:spPr>
-      </p:pic>
-      <p:sp>
-        <p:nvSpPr>
-          <p:cNvPr id="18" name="Textfeld 17">
-            <a:extLst>
-              <a:ext uri="{FF2B5EF4-FFF2-40B4-BE49-F238E27FC236}">
-                <a16:creationId xmlns:a16="http://schemas.microsoft.com/office/drawing/2014/main" id="{446D033E-A5D0-39AA-4F3E-F288EADB8BAB}"/>
-              </a:ext>
-            </a:extLst>
-          </p:cNvPr>
-          <p:cNvSpPr txBox="1"/>
-          <p:nvPr/>
-        </p:nvSpPr>
-        <p:spPr>
-          <a:xfrm>
-            <a:off x="1212978" y="4707375"/>
-            <a:ext cx="3666931" cy="923330"/>
-          </a:xfrm>
-          <a:prstGeom prst="rect">
-            <a:avLst/>
-          </a:prstGeom>
-          <a:noFill/>
-        </p:spPr>
-        <p:txBody>
-          <a:bodyPr wrap="square" rtlCol="0">
-            <a:spAutoFit/>
-          </a:bodyPr>
-          <a:lstStyle/>
-          <a:p>
-            <a:r>
-              <a:rPr lang="de-DE" dirty="0"/>
-              <a:t>Hinzufügen zu der geladenen List &amp; </a:t>
-            </a:r>
-            <a:r>
-              <a:rPr lang="de-DE" dirty="0" err="1"/>
-              <a:t>aktualiserte</a:t>
-            </a:r>
-            <a:r>
-              <a:rPr lang="de-DE" dirty="0"/>
-              <a:t> Liste der </a:t>
-            </a:r>
-            <a:r>
-              <a:rPr lang="de-DE" dirty="0" err="1"/>
-              <a:t>write</a:t>
-            </a:r>
-            <a:r>
-              <a:rPr lang="de-DE" dirty="0"/>
-              <a:t> Methode übergeben</a:t>
-            </a:r>
-          </a:p>
-        </p:txBody>
-      </p:sp>
-      <p:sp>
-        <p:nvSpPr>
-          <p:cNvPr id="4" name="Textfeld 3">
-            <a:extLst>
-              <a:ext uri="{FF2B5EF4-FFF2-40B4-BE49-F238E27FC236}">
-                <a16:creationId xmlns:a16="http://schemas.microsoft.com/office/drawing/2014/main" id="{62510059-78BB-197E-C018-B02A5CBF1DCC}"/>
-              </a:ext>
-            </a:extLst>
-          </p:cNvPr>
-          <p:cNvSpPr txBox="1"/>
-          <p:nvPr/>
-        </p:nvSpPr>
-        <p:spPr>
-          <a:xfrm>
-            <a:off x="1212977" y="5661497"/>
-            <a:ext cx="3666931" cy="369332"/>
-          </a:xfrm>
-          <a:prstGeom prst="rect">
-            <a:avLst/>
-          </a:prstGeom>
-          <a:noFill/>
-        </p:spPr>
-        <p:txBody>
-          <a:bodyPr wrap="square" rtlCol="0">
-            <a:spAutoFit/>
-          </a:bodyPr>
-          <a:lstStyle/>
-          <a:p>
-            <a:r>
-              <a:rPr lang="de-DE" dirty="0"/>
-              <a:t>Fehlerbehandlung</a:t>
-            </a:r>
-          </a:p>
-        </p:txBody>
-      </p:sp>
-      <p:pic>
-        <p:nvPicPr>
-          <p:cNvPr id="7" name="Grafik 6">
-            <a:extLst>
-              <a:ext uri="{FF2B5EF4-FFF2-40B4-BE49-F238E27FC236}">
-                <a16:creationId xmlns:a16="http://schemas.microsoft.com/office/drawing/2014/main" id="{1B978A36-C077-8616-1332-773E7085205A}"/>
-              </a:ext>
-            </a:extLst>
-          </p:cNvPr>
-          <p:cNvPicPr>
-            <a:picLocks noChangeAspect="1"/>
-          </p:cNvPicPr>
-          <p:nvPr/>
-        </p:nvPicPr>
-        <p:blipFill rotWithShape="1">
-          <a:blip r:embed="rId2"/>
-          <a:srcRect t="11656" b="80325"/>
-          <a:stretch/>
-        </p:blipFill>
-        <p:spPr>
-          <a:xfrm>
-            <a:off x="5015397" y="2435601"/>
-            <a:ext cx="6250191" cy="323150"/>
-          </a:xfrm>
-          <a:prstGeom prst="rect">
-            <a:avLst/>
-          </a:prstGeom>
-        </p:spPr>
-      </p:pic>
-      <p:pic>
-        <p:nvPicPr>
-          <p:cNvPr id="8" name="Grafik 7">
-            <a:extLst>
-              <a:ext uri="{FF2B5EF4-FFF2-40B4-BE49-F238E27FC236}">
-                <a16:creationId xmlns:a16="http://schemas.microsoft.com/office/drawing/2014/main" id="{3C3276A6-2835-12F4-B89E-F8C19D140E8D}"/>
-              </a:ext>
-            </a:extLst>
-          </p:cNvPr>
-          <p:cNvPicPr>
-            <a:picLocks noChangeAspect="1"/>
-          </p:cNvPicPr>
-          <p:nvPr/>
-        </p:nvPicPr>
-        <p:blipFill rotWithShape="1">
-          <a:blip r:embed="rId2"/>
-          <a:srcRect t="86967"/>
-          <a:stretch/>
-        </p:blipFill>
-        <p:spPr>
-          <a:xfrm>
-            <a:off x="5015396" y="5505683"/>
-            <a:ext cx="6250191" cy="525146"/>
-          </a:xfrm>
-          <a:prstGeom prst="rect">
-            <a:avLst/>
-          </a:prstGeom>
-        </p:spPr>
-      </p:pic>
-    </p:spTree>
-    <p:extLst>
-      <p:ext uri="{BB962C8B-B14F-4D97-AF65-F5344CB8AC3E}">
-        <p14:creationId xmlns:p14="http://schemas.microsoft.com/office/powerpoint/2010/main" val="1011116396"/>
-      </p:ext>
-    </p:extLst>
-  </p:cSld>
-  <p:clrMapOvr>
-    <a:masterClrMapping/>
-  </p:clrMapOvr>
-  <p:timing>
-    <p:tnLst>
-      <p:par>
-        <p:cTn id="1" dur="indefinite" restart="never" nodeType="tmRoot">
-          <p:childTnLst>
-            <p:seq concurrent="1" nextAc="seek">
-              <p:cTn id="2" dur="indefinite" nodeType="mainSeq">
-                <p:childTnLst>
-                  <p:par>
-                    <p:cTn id="3" fill="hold">
-                      <p:stCondLst>
-                        <p:cond delay="indefinite"/>
-                      </p:stCondLst>
-                      <p:childTnLst>
-                        <p:par>
-                          <p:cTn id="4" fill="hold">
-                            <p:stCondLst>
-                              <p:cond delay="0"/>
-                            </p:stCondLst>
-                            <p:childTnLst>
-                              <p:par>
-                                <p:cTn id="5" presetID="1" presetClass="entr" presetSubtype="0" fill="hold" grpId="0" nodeType="clickEffect">
-                                  <p:stCondLst>
-                                    <p:cond delay="0"/>
-                                  </p:stCondLst>
-                                  <p:childTnLst>
-                                    <p:set>
-                                      <p:cBhvr>
-                                        <p:cTn id="6" dur="1" fill="hold">
-                                          <p:stCondLst>
-                                            <p:cond delay="0"/>
-                                          </p:stCondLst>
-                                        </p:cTn>
-                                        <p:tgtEl>
-                                          <p:spTgt spid="3"/>
-                                        </p:tgtEl>
-                                        <p:attrNameLst>
-                                          <p:attrName>style.visibility</p:attrName>
-                                        </p:attrNameLst>
-                                      </p:cBhvr>
-                                      <p:to>
-                                        <p:strVal val="visible"/>
-                                      </p:to>
-                                    </p:set>
-                                  </p:childTnLst>
-                                </p:cTn>
-                              </p:par>
-                              <p:par>
-                                <p:cTn id="7" presetID="1" presetClass="entr" presetSubtype="0" fill="hold" nodeType="withEffect">
-                                  <p:stCondLst>
-                                    <p:cond delay="0"/>
-                                  </p:stCondLst>
-                                  <p:childTnLst>
-                                    <p:set>
-                                      <p:cBhvr>
-                                        <p:cTn id="8" dur="1" fill="hold">
-                                          <p:stCondLst>
-                                            <p:cond delay="0"/>
-                                          </p:stCondLst>
-                                        </p:cTn>
-                                        <p:tgtEl>
-                                          <p:spTgt spid="10"/>
-                                        </p:tgtEl>
-                                        <p:attrNameLst>
-                                          <p:attrName>style.visibility</p:attrName>
-                                        </p:attrNameLst>
-                                      </p:cBhvr>
-                                      <p:to>
-                                        <p:strVal val="visible"/>
-                                      </p:to>
-                                    </p:set>
-                                  </p:childTnLst>
-                                </p:cTn>
-                              </p:par>
-                            </p:childTnLst>
-                          </p:cTn>
-                        </p:par>
-                      </p:childTnLst>
-                    </p:cTn>
-                  </p:par>
-                  <p:par>
-                    <p:cTn id="9" fill="hold">
-                      <p:stCondLst>
-                        <p:cond delay="indefinite"/>
-                      </p:stCondLst>
-                      <p:childTnLst>
-                        <p:par>
-                          <p:cTn id="10" fill="hold">
-                            <p:stCondLst>
-                              <p:cond delay="0"/>
-                            </p:stCondLst>
-                            <p:childTnLst>
-                              <p:par>
-                                <p:cTn id="11" presetID="1" presetClass="entr" presetSubtype="0" fill="hold" grpId="0" nodeType="clickEffect">
-                                  <p:stCondLst>
-                                    <p:cond delay="0"/>
-                                  </p:stCondLst>
-                                  <p:childTnLst>
-                                    <p:set>
-                                      <p:cBhvr>
-                                        <p:cTn id="12" dur="1" fill="hold">
-                                          <p:stCondLst>
-                                            <p:cond delay="0"/>
-                                          </p:stCondLst>
-                                        </p:cTn>
-                                        <p:tgtEl>
-                                          <p:spTgt spid="6"/>
-                                        </p:tgtEl>
-                                        <p:attrNameLst>
-                                          <p:attrName>style.visibility</p:attrName>
-                                        </p:attrNameLst>
-                                      </p:cBhvr>
-                                      <p:to>
-                                        <p:strVal val="visible"/>
-                                      </p:to>
-                                    </p:set>
-                                  </p:childTnLst>
-                                </p:cTn>
-                              </p:par>
-                              <p:par>
-                                <p:cTn id="13" presetID="1" presetClass="entr" presetSubtype="0" fill="hold" nodeType="withEffect">
-                                  <p:stCondLst>
-                                    <p:cond delay="0"/>
-                                  </p:stCondLst>
-                                  <p:childTnLst>
-                                    <p:set>
-                                      <p:cBhvr>
-                                        <p:cTn id="14" dur="1" fill="hold">
-                                          <p:stCondLst>
-                                            <p:cond delay="0"/>
-                                          </p:stCondLst>
-                                        </p:cTn>
-                                        <p:tgtEl>
-                                          <p:spTgt spid="13"/>
-                                        </p:tgtEl>
-                                        <p:attrNameLst>
-                                          <p:attrName>style.visibility</p:attrName>
-                                        </p:attrNameLst>
-                                      </p:cBhvr>
-                                      <p:to>
-                                        <p:strVal val="visible"/>
-                                      </p:to>
-                                    </p:set>
-                                  </p:childTnLst>
-                                </p:cTn>
-                              </p:par>
-                            </p:childTnLst>
-                          </p:cTn>
-                        </p:par>
-                      </p:childTnLst>
-                    </p:cTn>
-                  </p:par>
-                  <p:par>
-                    <p:cTn id="15" fill="hold">
-                      <p:stCondLst>
-                        <p:cond delay="indefinite"/>
-                      </p:stCondLst>
-                      <p:childTnLst>
-                        <p:par>
-                          <p:cTn id="16" fill="hold">
-                            <p:stCondLst>
-                              <p:cond delay="0"/>
-                            </p:stCondLst>
-                            <p:childTnLst>
-                              <p:par>
-                                <p:cTn id="17" presetID="1" presetClass="entr" presetSubtype="0" fill="hold" grpId="0" nodeType="clickEffect">
-                                  <p:stCondLst>
-                                    <p:cond delay="0"/>
-                                  </p:stCondLst>
-                                  <p:childTnLst>
-                                    <p:set>
-                                      <p:cBhvr>
-                                        <p:cTn id="18" dur="1" fill="hold">
-                                          <p:stCondLst>
-                                            <p:cond delay="0"/>
-                                          </p:stCondLst>
-                                        </p:cTn>
-                                        <p:tgtEl>
-                                          <p:spTgt spid="16"/>
-                                        </p:tgtEl>
-                                        <p:attrNameLst>
-                                          <p:attrName>style.visibility</p:attrName>
-                                        </p:attrNameLst>
-                                      </p:cBhvr>
-                                      <p:to>
-                                        <p:strVal val="visible"/>
-                                      </p:to>
-                                    </p:set>
-                                  </p:childTnLst>
-                                </p:cTn>
-                              </p:par>
-                              <p:par>
-                                <p:cTn id="19" presetID="1" presetClass="entr" presetSubtype="0" fill="hold" nodeType="withEffect">
-                                  <p:stCondLst>
-                                    <p:cond delay="0"/>
-                                  </p:stCondLst>
-                                  <p:childTnLst>
-                                    <p:set>
-                                      <p:cBhvr>
-                                        <p:cTn id="20" dur="1" fill="hold">
-                                          <p:stCondLst>
-                                            <p:cond delay="0"/>
-                                          </p:stCondLst>
-                                        </p:cTn>
-                                        <p:tgtEl>
-                                          <p:spTgt spid="14"/>
-                                        </p:tgtEl>
-                                        <p:attrNameLst>
-                                          <p:attrName>style.visibility</p:attrName>
-                                        </p:attrNameLst>
-                                      </p:cBhvr>
-                                      <p:to>
-                                        <p:strVal val="visible"/>
-                                      </p:to>
-                                    </p:set>
-                                  </p:childTnLst>
-                                </p:cTn>
-                              </p:par>
-                            </p:childTnLst>
-                          </p:cTn>
-                        </p:par>
-                      </p:childTnLst>
-                    </p:cTn>
-                  </p:par>
-                  <p:par>
-                    <p:cTn id="21" fill="hold">
-                      <p:stCondLst>
-                        <p:cond delay="indefinite"/>
-                      </p:stCondLst>
-                      <p:childTnLst>
-                        <p:par>
-                          <p:cTn id="22" fill="hold">
-                            <p:stCondLst>
-                              <p:cond delay="0"/>
-                            </p:stCondLst>
-                            <p:childTnLst>
-                              <p:par>
-                                <p:cTn id="23" presetID="1" presetClass="entr" presetSubtype="0" fill="hold" grpId="0" nodeType="clickEffect">
-                                  <p:stCondLst>
-                                    <p:cond delay="0"/>
-                                  </p:stCondLst>
-                                  <p:childTnLst>
-                                    <p:set>
-                                      <p:cBhvr>
-                                        <p:cTn id="24" dur="1" fill="hold">
-                                          <p:stCondLst>
-                                            <p:cond delay="0"/>
-                                          </p:stCondLst>
-                                        </p:cTn>
-                                        <p:tgtEl>
-                                          <p:spTgt spid="18"/>
-                                        </p:tgtEl>
-                                        <p:attrNameLst>
-                                          <p:attrName>style.visibility</p:attrName>
-                                        </p:attrNameLst>
-                                      </p:cBhvr>
-                                      <p:to>
-                                        <p:strVal val="visible"/>
-                                      </p:to>
-                                    </p:set>
-                                  </p:childTnLst>
-                                </p:cTn>
-                              </p:par>
-                              <p:par>
-                                <p:cTn id="25" presetID="1" presetClass="entr" presetSubtype="0" fill="hold" nodeType="withEffect">
-                                  <p:stCondLst>
-                                    <p:cond delay="0"/>
-                                  </p:stCondLst>
-                                  <p:childTnLst>
-                                    <p:set>
-                                      <p:cBhvr>
-                                        <p:cTn id="26" dur="1" fill="hold">
-                                          <p:stCondLst>
-                                            <p:cond delay="0"/>
-                                          </p:stCondLst>
-                                        </p:cTn>
-                                        <p:tgtEl>
-                                          <p:spTgt spid="17"/>
-                                        </p:tgtEl>
-                                        <p:attrNameLst>
-                                          <p:attrName>style.visibility</p:attrName>
-                                        </p:attrNameLst>
-                                      </p:cBhvr>
-                                      <p:to>
-                                        <p:strVal val="visible"/>
-                                      </p:to>
-                                    </p:set>
-                                  </p:childTnLst>
-                                </p:cTn>
-                              </p:par>
-                            </p:childTnLst>
-                          </p:cTn>
-                        </p:par>
-                      </p:childTnLst>
-                    </p:cTn>
-                  </p:par>
-                  <p:par>
-                    <p:cTn id="27" fill="hold">
-                      <p:stCondLst>
-                        <p:cond delay="indefinite"/>
-                      </p:stCondLst>
-                      <p:childTnLst>
-                        <p:par>
-                          <p:cTn id="28" fill="hold">
-                            <p:stCondLst>
-                              <p:cond delay="0"/>
-                            </p:stCondLst>
-                            <p:childTnLst>
-                              <p:par>
-                                <p:cTn id="29" presetID="1" presetClass="entr" presetSubtype="0" fill="hold" grpId="0" nodeType="clickEffect">
-                                  <p:stCondLst>
-                                    <p:cond delay="0"/>
-                                  </p:stCondLst>
-                                  <p:childTnLst>
-                                    <p:set>
-                                      <p:cBhvr>
-                                        <p:cTn id="30" dur="1" fill="hold">
-                                          <p:stCondLst>
-                                            <p:cond delay="0"/>
-                                          </p:stCondLst>
-                                        </p:cTn>
-                                        <p:tgtEl>
-                                          <p:spTgt spid="4"/>
-                                        </p:tgtEl>
-                                        <p:attrNameLst>
-                                          <p:attrName>style.visibility</p:attrName>
-                                        </p:attrNameLst>
-                                      </p:cBhvr>
-                                      <p:to>
-                                        <p:strVal val="visible"/>
-                                      </p:to>
-                                    </p:set>
-                                  </p:childTnLst>
-                                </p:cTn>
-                              </p:par>
-                              <p:par>
-                                <p:cTn id="31" presetID="1" presetClass="entr" presetSubtype="0" fill="hold" nodeType="withEffect">
-                                  <p:stCondLst>
-                                    <p:cond delay="0"/>
-                                  </p:stCondLst>
-                                  <p:childTnLst>
-                                    <p:set>
-                                      <p:cBhvr>
-                                        <p:cTn id="32" dur="1" fill="hold">
-                                          <p:stCondLst>
-                                            <p:cond delay="0"/>
-                                          </p:stCondLst>
-                                        </p:cTn>
-                                        <p:tgtEl>
-                                          <p:spTgt spid="7"/>
-                                        </p:tgtEl>
-                                        <p:attrNameLst>
-                                          <p:attrName>style.visibility</p:attrName>
-                                        </p:attrNameLst>
-                                      </p:cBhvr>
-                                      <p:to>
-                                        <p:strVal val="visible"/>
-                                      </p:to>
-                                    </p:set>
-                                  </p:childTnLst>
-                                </p:cTn>
-                              </p:par>
-                              <p:par>
-                                <p:cTn id="33" presetID="1" presetClass="entr" presetSubtype="0" fill="hold" nodeType="withEffect">
-                                  <p:stCondLst>
-                                    <p:cond delay="0"/>
-                                  </p:stCondLst>
-                                  <p:childTnLst>
-                                    <p:set>
-                                      <p:cBhvr>
-                                        <p:cTn id="34" dur="1" fill="hold">
-                                          <p:stCondLst>
-                                            <p:cond delay="0"/>
-                                          </p:stCondLst>
-                                        </p:cTn>
-                                        <p:tgtEl>
-                                          <p:spTgt spid="8"/>
-                                        </p:tgtEl>
-                                        <p:attrNameLst>
-                                          <p:attrName>style.visibility</p:attrName>
-                                        </p:attrNameLst>
-                                      </p:cBhvr>
-                                      <p:to>
-                                        <p:strVal val="visible"/>
-                                      </p:to>
-                                    </p:set>
-                                  </p:childTnLst>
-                                </p:cTn>
-                              </p:par>
-                            </p:childTnLst>
-                          </p:cTn>
-                        </p:par>
-                      </p:childTnLst>
-                    </p:cTn>
-                  </p:par>
-                </p:childTnLst>
-              </p:cTn>
-              <p:prevCondLst>
-                <p:cond evt="onPrev" delay="0">
-                  <p:tgtEl>
-                    <p:sldTgt/>
-                  </p:tgtEl>
-                </p:cond>
-              </p:prevCondLst>
-              <p:nextCondLst>
-                <p:cond evt="onNext" delay="0">
-                  <p:tgtEl>
-                    <p:sldTgt/>
-                  </p:tgtEl>
-                </p:cond>
-              </p:nextCondLst>
-            </p:seq>
-          </p:childTnLst>
-        </p:cTn>
-      </p:par>
-    </p:tnLst>
-    <p:bldLst>
-      <p:bldP spid="3" grpId="0"/>
-      <p:bldP spid="6" grpId="0"/>
-      <p:bldP spid="16" grpId="0"/>
-      <p:bldP spid="18" grpId="0"/>
-      <p:bldP spid="4" grpId="0"/>
-    </p:bldLst>
-  </p:timing>
-</p:sld>
-</file>
-
-<file path=ppt/slides/slide7.xml><?xml version="1.0" encoding="utf-8"?>
-<p:sld xmlns:a="http://schemas.openxmlformats.org/drawingml/2006/main" xmlns:r="http://schemas.openxmlformats.org/officeDocument/2006/relationships" xmlns:p="http://schemas.openxmlformats.org/presentationml/2006/main">
-  <p:cSld>
-    <p:spTree>
-      <p:nvGrpSpPr>
-        <p:cNvPr id="1" name=""/>
-        <p:cNvGrpSpPr/>
-        <p:nvPr/>
-      </p:nvGrpSpPr>
-      <p:grpSpPr>
-        <a:xfrm>
-          <a:off x="0" y="0"/>
-          <a:ext cx="0" cy="0"/>
-          <a:chOff x="0" y="0"/>
-          <a:chExt cx="0" cy="0"/>
-        </a:xfrm>
-      </p:grpSpPr>
-      <p:sp>
-        <p:nvSpPr>
-          <p:cNvPr id="2" name="Titel 1">
-            <a:extLst>
-              <a:ext uri="{FF2B5EF4-FFF2-40B4-BE49-F238E27FC236}">
-                <a16:creationId xmlns:a16="http://schemas.microsoft.com/office/drawing/2014/main" id="{8D059D17-FC61-D6F1-AE82-A2A9AB66B645}"/>
-              </a:ext>
-            </a:extLst>
-          </p:cNvPr>
-          <p:cNvSpPr>
-            <a:spLocks noGrp="1"/>
-          </p:cNvSpPr>
-          <p:nvPr>
-            <p:ph type="title"/>
-          </p:nvPr>
-        </p:nvSpPr>
-        <p:spPr/>
-        <p:txBody>
-          <a:bodyPr/>
-          <a:lstStyle/>
-          <a:p>
-            <a:r>
-              <a:rPr lang="de-DE" dirty="0"/>
-              <a:t>Tasks</a:t>
+              <a:t>Task State anpassen</a:t>
             </a:r>
           </a:p>
         </p:txBody>
@@ -5587,7 +4196,7 @@
 </p:sld>
 </file>
 
-<file path=ppt/slides/slide8.xml><?xml version="1.0" encoding="utf-8"?>
+<file path=ppt/slides/slide11.xml><?xml version="1.0" encoding="utf-8"?>
 <p:sld xmlns:a="http://schemas.openxmlformats.org/drawingml/2006/main" xmlns:r="http://schemas.openxmlformats.org/officeDocument/2006/relationships" xmlns:p="http://schemas.openxmlformats.org/presentationml/2006/main">
   <p:cSld>
     <p:spTree>
@@ -5627,7 +4236,7 @@
           <a:p>
             <a:r>
               <a:rPr lang="de-DE" dirty="0"/>
-              <a:t>Tasks</a:t>
+              <a:t>Tasks löschen</a:t>
             </a:r>
           </a:p>
         </p:txBody>
@@ -6286,6 +4895,1954 @@
 </p:sld>
 </file>
 
+<file path=ppt/slides/slide12.xml><?xml version="1.0" encoding="utf-8"?>
+<p:sld xmlns:a="http://schemas.openxmlformats.org/drawingml/2006/main" xmlns:r="http://schemas.openxmlformats.org/officeDocument/2006/relationships" xmlns:p="http://schemas.openxmlformats.org/presentationml/2006/main">
+  <p:cSld>
+    <p:spTree>
+      <p:nvGrpSpPr>
+        <p:cNvPr id="1" name=""/>
+        <p:cNvGrpSpPr/>
+        <p:nvPr/>
+      </p:nvGrpSpPr>
+      <p:grpSpPr>
+        <a:xfrm>
+          <a:off x="0" y="0"/>
+          <a:ext cx="0" cy="0"/>
+          <a:chOff x="0" y="0"/>
+          <a:chExt cx="0" cy="0"/>
+        </a:xfrm>
+      </p:grpSpPr>
+      <p:sp>
+        <p:nvSpPr>
+          <p:cNvPr id="2" name="Titel 1">
+            <a:extLst>
+              <a:ext uri="{FF2B5EF4-FFF2-40B4-BE49-F238E27FC236}">
+                <a16:creationId xmlns:a16="http://schemas.microsoft.com/office/drawing/2014/main" id="{801F39F8-AE1F-A9BD-B267-7DCF34B80A1D}"/>
+              </a:ext>
+            </a:extLst>
+          </p:cNvPr>
+          <p:cNvSpPr>
+            <a:spLocks noGrp="1"/>
+          </p:cNvSpPr>
+          <p:nvPr>
+            <p:ph type="title"/>
+          </p:nvPr>
+        </p:nvSpPr>
+        <p:spPr>
+          <a:xfrm>
+            <a:off x="1158240" y="2750820"/>
+            <a:ext cx="9875520" cy="1356360"/>
+          </a:xfrm>
+        </p:spPr>
+        <p:txBody>
+          <a:bodyPr/>
+          <a:lstStyle/>
+          <a:p>
+            <a:pPr algn="ctr"/>
+            <a:r>
+              <a:rPr lang="de-DE" dirty="0"/>
+              <a:t>Vielen Dank fürs Zuhören </a:t>
+            </a:r>
+            <a:r>
+              <a:rPr lang="de-DE" dirty="0">
+                <a:sym typeface="Wingdings" panose="05000000000000000000" pitchFamily="2" charset="2"/>
+              </a:rPr>
+              <a:t></a:t>
+            </a:r>
+            <a:endParaRPr lang="de-DE" dirty="0"/>
+          </a:p>
+        </p:txBody>
+      </p:sp>
+    </p:spTree>
+    <p:extLst>
+      <p:ext uri="{BB962C8B-B14F-4D97-AF65-F5344CB8AC3E}">
+        <p14:creationId xmlns:p14="http://schemas.microsoft.com/office/powerpoint/2010/main" val="125219893"/>
+      </p:ext>
+    </p:extLst>
+  </p:cSld>
+  <p:clrMapOvr>
+    <a:masterClrMapping/>
+  </p:clrMapOvr>
+</p:sld>
+</file>
+
+<file path=ppt/slides/slide2.xml><?xml version="1.0" encoding="utf-8"?>
+<p:sld xmlns:a="http://schemas.openxmlformats.org/drawingml/2006/main" xmlns:r="http://schemas.openxmlformats.org/officeDocument/2006/relationships" xmlns:p="http://schemas.openxmlformats.org/presentationml/2006/main">
+  <p:cSld>
+    <p:spTree>
+      <p:nvGrpSpPr>
+        <p:cNvPr id="1" name=""/>
+        <p:cNvGrpSpPr/>
+        <p:nvPr/>
+      </p:nvGrpSpPr>
+      <p:grpSpPr>
+        <a:xfrm>
+          <a:off x="0" y="0"/>
+          <a:ext cx="0" cy="0"/>
+          <a:chOff x="0" y="0"/>
+          <a:chExt cx="0" cy="0"/>
+        </a:xfrm>
+      </p:grpSpPr>
+      <p:sp>
+        <p:nvSpPr>
+          <p:cNvPr id="2" name="Titel 1">
+            <a:extLst>
+              <a:ext uri="{FF2B5EF4-FFF2-40B4-BE49-F238E27FC236}">
+                <a16:creationId xmlns:a16="http://schemas.microsoft.com/office/drawing/2014/main" id="{B87B09F6-C8A0-084A-622D-A84918CF882F}"/>
+              </a:ext>
+            </a:extLst>
+          </p:cNvPr>
+          <p:cNvSpPr>
+            <a:spLocks noGrp="1"/>
+          </p:cNvSpPr>
+          <p:nvPr>
+            <p:ph type="title"/>
+          </p:nvPr>
+        </p:nvSpPr>
+        <p:spPr/>
+        <p:txBody>
+          <a:bodyPr/>
+          <a:lstStyle/>
+          <a:p>
+            <a:r>
+              <a:rPr lang="de-DE" dirty="0"/>
+              <a:t>Hans ist…</a:t>
+            </a:r>
+          </a:p>
+        </p:txBody>
+      </p:sp>
+      <p:sp>
+        <p:nvSpPr>
+          <p:cNvPr id="3" name="Textfeld 2">
+            <a:extLst>
+              <a:ext uri="{FF2B5EF4-FFF2-40B4-BE49-F238E27FC236}">
+                <a16:creationId xmlns:a16="http://schemas.microsoft.com/office/drawing/2014/main" id="{38D88763-AB3F-7D68-32E3-464B04FA3988}"/>
+              </a:ext>
+            </a:extLst>
+          </p:cNvPr>
+          <p:cNvSpPr txBox="1"/>
+          <p:nvPr/>
+        </p:nvSpPr>
+        <p:spPr>
+          <a:xfrm>
+            <a:off x="4923934" y="2534897"/>
+            <a:ext cx="2344132" cy="2677656"/>
+          </a:xfrm>
+          <a:prstGeom prst="rect">
+            <a:avLst/>
+          </a:prstGeom>
+          <a:noFill/>
+        </p:spPr>
+        <p:txBody>
+          <a:bodyPr wrap="square" rtlCol="0">
+            <a:spAutoFit/>
+          </a:bodyPr>
+          <a:lstStyle/>
+          <a:p>
+            <a:pPr algn="ctr"/>
+            <a:r>
+              <a:rPr lang="de-DE" sz="2400" dirty="0"/>
+              <a:t>vergesslich</a:t>
+            </a:r>
+          </a:p>
+          <a:p>
+            <a:pPr algn="ctr"/>
+            <a:endParaRPr lang="de-DE" sz="2400" dirty="0"/>
+          </a:p>
+          <a:p>
+            <a:pPr algn="ctr"/>
+            <a:r>
+              <a:rPr lang="de-DE" sz="2400" dirty="0"/>
+              <a:t>unorganisiert</a:t>
+            </a:r>
+          </a:p>
+          <a:p>
+            <a:pPr algn="ctr"/>
+            <a:endParaRPr lang="de-DE" sz="2400" dirty="0"/>
+          </a:p>
+          <a:p>
+            <a:pPr algn="ctr"/>
+            <a:r>
+              <a:rPr lang="de-DE" sz="2400" dirty="0"/>
+              <a:t>technikaffin</a:t>
+            </a:r>
+          </a:p>
+          <a:p>
+            <a:pPr algn="ctr"/>
+            <a:endParaRPr lang="de-DE" sz="2400" dirty="0"/>
+          </a:p>
+          <a:p>
+            <a:pPr algn="ctr"/>
+            <a:r>
+              <a:rPr lang="de-DE" sz="2400" dirty="0"/>
+              <a:t>gut in Python</a:t>
+            </a:r>
+          </a:p>
+        </p:txBody>
+      </p:sp>
+    </p:spTree>
+    <p:extLst>
+      <p:ext uri="{BB962C8B-B14F-4D97-AF65-F5344CB8AC3E}">
+        <p14:creationId xmlns:p14="http://schemas.microsoft.com/office/powerpoint/2010/main" val="2094422801"/>
+      </p:ext>
+    </p:extLst>
+  </p:cSld>
+  <p:clrMapOvr>
+    <a:masterClrMapping/>
+  </p:clrMapOvr>
+</p:sld>
+</file>
+
+<file path=ppt/slides/slide3.xml><?xml version="1.0" encoding="utf-8"?>
+<p:sld xmlns:a="http://schemas.openxmlformats.org/drawingml/2006/main" xmlns:r="http://schemas.openxmlformats.org/officeDocument/2006/relationships" xmlns:p="http://schemas.openxmlformats.org/presentationml/2006/main">
+  <p:cSld>
+    <p:spTree>
+      <p:nvGrpSpPr>
+        <p:cNvPr id="1" name=""/>
+        <p:cNvGrpSpPr/>
+        <p:nvPr/>
+      </p:nvGrpSpPr>
+      <p:grpSpPr>
+        <a:xfrm>
+          <a:off x="0" y="0"/>
+          <a:ext cx="0" cy="0"/>
+          <a:chOff x="0" y="0"/>
+          <a:chExt cx="0" cy="0"/>
+        </a:xfrm>
+      </p:grpSpPr>
+      <p:sp>
+        <p:nvSpPr>
+          <p:cNvPr id="2" name="Titel 1">
+            <a:extLst>
+              <a:ext uri="{FF2B5EF4-FFF2-40B4-BE49-F238E27FC236}">
+                <a16:creationId xmlns:a16="http://schemas.microsoft.com/office/drawing/2014/main" id="{17C75D57-F49E-2D4A-92B6-3F4E8598A629}"/>
+              </a:ext>
+            </a:extLst>
+          </p:cNvPr>
+          <p:cNvSpPr>
+            <a:spLocks noGrp="1"/>
+          </p:cNvSpPr>
+          <p:nvPr>
+            <p:ph type="ctrTitle"/>
+          </p:nvPr>
+        </p:nvSpPr>
+        <p:spPr/>
+        <p:txBody>
+          <a:bodyPr/>
+          <a:lstStyle/>
+          <a:p>
+            <a:r>
+              <a:rPr lang="de-DE" dirty="0" err="1"/>
+              <a:t>Kivy</a:t>
+            </a:r>
+            <a:r>
+              <a:rPr lang="de-DE" dirty="0"/>
+              <a:t> Projekt</a:t>
+            </a:r>
+            <a:endParaRPr lang="LID4096" dirty="0"/>
+          </a:p>
+        </p:txBody>
+      </p:sp>
+      <p:sp>
+        <p:nvSpPr>
+          <p:cNvPr id="3" name="Untertitel 2">
+            <a:extLst>
+              <a:ext uri="{FF2B5EF4-FFF2-40B4-BE49-F238E27FC236}">
+                <a16:creationId xmlns:a16="http://schemas.microsoft.com/office/drawing/2014/main" id="{1DF6C7AE-7191-ADB6-CBBB-0136D5692263}"/>
+              </a:ext>
+            </a:extLst>
+          </p:cNvPr>
+          <p:cNvSpPr>
+            <a:spLocks noGrp="1"/>
+          </p:cNvSpPr>
+          <p:nvPr>
+            <p:ph type="subTitle" idx="1"/>
+          </p:nvPr>
+        </p:nvSpPr>
+        <p:spPr/>
+        <p:txBody>
+          <a:bodyPr/>
+          <a:lstStyle/>
+          <a:p>
+            <a:r>
+              <a:rPr lang="de-DE" dirty="0"/>
+              <a:t>Eric, Maxi, Elias</a:t>
+            </a:r>
+            <a:endParaRPr lang="LID4096" dirty="0"/>
+          </a:p>
+        </p:txBody>
+      </p:sp>
+    </p:spTree>
+    <p:extLst>
+      <p:ext uri="{BB962C8B-B14F-4D97-AF65-F5344CB8AC3E}">
+        <p14:creationId xmlns:p14="http://schemas.microsoft.com/office/powerpoint/2010/main" val="3637561198"/>
+      </p:ext>
+    </p:extLst>
+  </p:cSld>
+  <p:clrMapOvr>
+    <a:masterClrMapping/>
+  </p:clrMapOvr>
+</p:sld>
+</file>
+
+<file path=ppt/slides/slide4.xml><?xml version="1.0" encoding="utf-8"?>
+<p:sld xmlns:a="http://schemas.openxmlformats.org/drawingml/2006/main" xmlns:r="http://schemas.openxmlformats.org/officeDocument/2006/relationships" xmlns:p="http://schemas.openxmlformats.org/presentationml/2006/main">
+  <p:cSld>
+    <p:spTree>
+      <p:nvGrpSpPr>
+        <p:cNvPr id="1" name=""/>
+        <p:cNvGrpSpPr/>
+        <p:nvPr/>
+      </p:nvGrpSpPr>
+      <p:grpSpPr>
+        <a:xfrm>
+          <a:off x="0" y="0"/>
+          <a:ext cx="0" cy="0"/>
+          <a:chOff x="0" y="0"/>
+          <a:chExt cx="0" cy="0"/>
+        </a:xfrm>
+      </p:grpSpPr>
+      <p:sp>
+        <p:nvSpPr>
+          <p:cNvPr id="2" name="Titel 1">
+            <a:extLst>
+              <a:ext uri="{FF2B5EF4-FFF2-40B4-BE49-F238E27FC236}">
+                <a16:creationId xmlns:a16="http://schemas.microsoft.com/office/drawing/2014/main" id="{2D0E87ED-6989-CE3B-7FDF-EBE3D11CCD85}"/>
+              </a:ext>
+            </a:extLst>
+          </p:cNvPr>
+          <p:cNvSpPr>
+            <a:spLocks noGrp="1"/>
+          </p:cNvSpPr>
+          <p:nvPr>
+            <p:ph type="title"/>
+          </p:nvPr>
+        </p:nvSpPr>
+        <p:spPr/>
+        <p:txBody>
+          <a:bodyPr/>
+          <a:lstStyle/>
+          <a:p>
+            <a:r>
+              <a:rPr lang="de-DE" dirty="0"/>
+              <a:t>Was ist unser Projekt Thema?</a:t>
+            </a:r>
+            <a:endParaRPr lang="LID4096" dirty="0"/>
+          </a:p>
+        </p:txBody>
+      </p:sp>
+      <p:sp>
+        <p:nvSpPr>
+          <p:cNvPr id="3" name="Inhaltsplatzhalter 2">
+            <a:extLst>
+              <a:ext uri="{FF2B5EF4-FFF2-40B4-BE49-F238E27FC236}">
+                <a16:creationId xmlns:a16="http://schemas.microsoft.com/office/drawing/2014/main" id="{D6540878-2B96-7F2A-8BB6-A7C25C296320}"/>
+              </a:ext>
+            </a:extLst>
+          </p:cNvPr>
+          <p:cNvSpPr>
+            <a:spLocks noGrp="1"/>
+          </p:cNvSpPr>
+          <p:nvPr>
+            <p:ph idx="1"/>
+          </p:nvPr>
+        </p:nvSpPr>
+        <p:spPr/>
+        <p:txBody>
+          <a:bodyPr/>
+          <a:lstStyle/>
+          <a:p>
+            <a:endParaRPr lang="LID4096"/>
+          </a:p>
+        </p:txBody>
+      </p:sp>
+    </p:spTree>
+    <p:extLst>
+      <p:ext uri="{BB962C8B-B14F-4D97-AF65-F5344CB8AC3E}">
+        <p14:creationId xmlns:p14="http://schemas.microsoft.com/office/powerpoint/2010/main" val="628617651"/>
+      </p:ext>
+    </p:extLst>
+  </p:cSld>
+  <p:clrMapOvr>
+    <a:masterClrMapping/>
+  </p:clrMapOvr>
+</p:sld>
+</file>
+
+<file path=ppt/slides/slide5.xml><?xml version="1.0" encoding="utf-8"?>
+<p:sld xmlns:a="http://schemas.openxmlformats.org/drawingml/2006/main" xmlns:r="http://schemas.openxmlformats.org/officeDocument/2006/relationships" xmlns:p="http://schemas.openxmlformats.org/presentationml/2006/main">
+  <p:cSld>
+    <p:spTree>
+      <p:nvGrpSpPr>
+        <p:cNvPr id="1" name=""/>
+        <p:cNvGrpSpPr/>
+        <p:nvPr/>
+      </p:nvGrpSpPr>
+      <p:grpSpPr>
+        <a:xfrm>
+          <a:off x="0" y="0"/>
+          <a:ext cx="0" cy="0"/>
+          <a:chOff x="0" y="0"/>
+          <a:chExt cx="0" cy="0"/>
+        </a:xfrm>
+      </p:grpSpPr>
+      <p:sp>
+        <p:nvSpPr>
+          <p:cNvPr id="2" name="Titel 1">
+            <a:extLst>
+              <a:ext uri="{FF2B5EF4-FFF2-40B4-BE49-F238E27FC236}">
+                <a16:creationId xmlns:a16="http://schemas.microsoft.com/office/drawing/2014/main" id="{1803113C-B0D2-B232-68D9-5A6CD0F053F4}"/>
+              </a:ext>
+            </a:extLst>
+          </p:cNvPr>
+          <p:cNvSpPr>
+            <a:spLocks noGrp="1"/>
+          </p:cNvSpPr>
+          <p:nvPr>
+            <p:ph type="title"/>
+          </p:nvPr>
+        </p:nvSpPr>
+        <p:spPr/>
+        <p:txBody>
+          <a:bodyPr/>
+          <a:lstStyle/>
+          <a:p>
+            <a:r>
+              <a:rPr lang="de-DE" dirty="0"/>
+              <a:t>Eric</a:t>
+            </a:r>
+            <a:endParaRPr lang="LID4096" dirty="0"/>
+          </a:p>
+        </p:txBody>
+      </p:sp>
+      <p:sp>
+        <p:nvSpPr>
+          <p:cNvPr id="3" name="Inhaltsplatzhalter 2">
+            <a:extLst>
+              <a:ext uri="{FF2B5EF4-FFF2-40B4-BE49-F238E27FC236}">
+                <a16:creationId xmlns:a16="http://schemas.microsoft.com/office/drawing/2014/main" id="{689696B5-9623-F55B-65D9-CE7D126F230F}"/>
+              </a:ext>
+            </a:extLst>
+          </p:cNvPr>
+          <p:cNvSpPr>
+            <a:spLocks noGrp="1"/>
+          </p:cNvSpPr>
+          <p:nvPr>
+            <p:ph idx="1"/>
+          </p:nvPr>
+        </p:nvSpPr>
+        <p:spPr/>
+        <p:txBody>
+          <a:bodyPr/>
+          <a:lstStyle/>
+          <a:p>
+            <a:r>
+              <a:rPr lang="de-DE" dirty="0" err="1"/>
+              <a:t>Layout.kv</a:t>
+            </a:r>
+            <a:r>
+              <a:rPr lang="de-DE" dirty="0"/>
+              <a:t> erklären -Eric-</a:t>
+            </a:r>
+            <a:endParaRPr lang="LID4096" dirty="0"/>
+          </a:p>
+        </p:txBody>
+      </p:sp>
+    </p:spTree>
+    <p:extLst>
+      <p:ext uri="{BB962C8B-B14F-4D97-AF65-F5344CB8AC3E}">
+        <p14:creationId xmlns:p14="http://schemas.microsoft.com/office/powerpoint/2010/main" val="1223572070"/>
+      </p:ext>
+    </p:extLst>
+  </p:cSld>
+  <p:clrMapOvr>
+    <a:masterClrMapping/>
+  </p:clrMapOvr>
+</p:sld>
+</file>
+
+<file path=ppt/slides/slide6.xml><?xml version="1.0" encoding="utf-8"?>
+<p:sld xmlns:a="http://schemas.openxmlformats.org/drawingml/2006/main" xmlns:r="http://schemas.openxmlformats.org/officeDocument/2006/relationships" xmlns:p="http://schemas.openxmlformats.org/presentationml/2006/main">
+  <p:cSld>
+    <p:spTree>
+      <p:nvGrpSpPr>
+        <p:cNvPr id="1" name=""/>
+        <p:cNvGrpSpPr/>
+        <p:nvPr/>
+      </p:nvGrpSpPr>
+      <p:grpSpPr>
+        <a:xfrm>
+          <a:off x="0" y="0"/>
+          <a:ext cx="0" cy="0"/>
+          <a:chOff x="0" y="0"/>
+          <a:chExt cx="0" cy="0"/>
+        </a:xfrm>
+      </p:grpSpPr>
+      <p:sp>
+        <p:nvSpPr>
+          <p:cNvPr id="2" name="Titel 1">
+            <a:extLst>
+              <a:ext uri="{FF2B5EF4-FFF2-40B4-BE49-F238E27FC236}">
+                <a16:creationId xmlns:a16="http://schemas.microsoft.com/office/drawing/2014/main" id="{A32ADBC9-4189-536E-CBCA-214F2AE2F9F2}"/>
+              </a:ext>
+            </a:extLst>
+          </p:cNvPr>
+          <p:cNvSpPr>
+            <a:spLocks noGrp="1"/>
+          </p:cNvSpPr>
+          <p:nvPr>
+            <p:ph type="title"/>
+          </p:nvPr>
+        </p:nvSpPr>
+        <p:spPr>
+          <a:xfrm>
+            <a:off x="2742709" y="201336"/>
+            <a:ext cx="6706579" cy="959281"/>
+          </a:xfrm>
+        </p:spPr>
+        <p:txBody>
+          <a:bodyPr/>
+          <a:lstStyle/>
+          <a:p>
+            <a:r>
+              <a:rPr lang="de-DE" dirty="0"/>
+              <a:t>Lösungsansatz MQTT</a:t>
+            </a:r>
+            <a:endParaRPr lang="LID4096" dirty="0"/>
+          </a:p>
+        </p:txBody>
+      </p:sp>
+      <p:pic>
+        <p:nvPicPr>
+          <p:cNvPr id="13" name="Grafik 12">
+            <a:extLst>
+              <a:ext uri="{FF2B5EF4-FFF2-40B4-BE49-F238E27FC236}">
+                <a16:creationId xmlns:a16="http://schemas.microsoft.com/office/drawing/2014/main" id="{64E849AB-E85A-8FCE-CA2E-13F6241A44F5}"/>
+              </a:ext>
+            </a:extLst>
+          </p:cNvPr>
+          <p:cNvPicPr>
+            <a:picLocks noChangeAspect="1"/>
+          </p:cNvPicPr>
+          <p:nvPr/>
+        </p:nvPicPr>
+        <p:blipFill>
+          <a:blip r:embed="rId2"/>
+          <a:stretch>
+            <a:fillRect/>
+          </a:stretch>
+        </p:blipFill>
+        <p:spPr>
+          <a:xfrm>
+            <a:off x="937583" y="1326735"/>
+            <a:ext cx="2463927" cy="1771741"/>
+          </a:xfrm>
+          <a:prstGeom prst="rect">
+            <a:avLst/>
+          </a:prstGeom>
+        </p:spPr>
+      </p:pic>
+      <p:sp>
+        <p:nvSpPr>
+          <p:cNvPr id="16" name="Pfeil: nach rechts 15">
+            <a:extLst>
+              <a:ext uri="{FF2B5EF4-FFF2-40B4-BE49-F238E27FC236}">
+                <a16:creationId xmlns:a16="http://schemas.microsoft.com/office/drawing/2014/main" id="{D6F2C81F-B965-2E01-47D4-82E90157CD93}"/>
+              </a:ext>
+            </a:extLst>
+          </p:cNvPr>
+          <p:cNvSpPr/>
+          <p:nvPr/>
+        </p:nvSpPr>
+        <p:spPr>
+          <a:xfrm rot="18728639">
+            <a:off x="4130976" y="3587275"/>
+            <a:ext cx="627244" cy="528933"/>
+          </a:xfrm>
+          <a:prstGeom prst="rightArrow">
+            <a:avLst/>
+          </a:prstGeom>
+        </p:spPr>
+        <p:style>
+          <a:lnRef idx="2">
+            <a:schemeClr val="accent1">
+              <a:shade val="15000"/>
+            </a:schemeClr>
+          </a:lnRef>
+          <a:fillRef idx="1">
+            <a:schemeClr val="accent1"/>
+          </a:fillRef>
+          <a:effectRef idx="0">
+            <a:schemeClr val="accent1"/>
+          </a:effectRef>
+          <a:fontRef idx="minor">
+            <a:schemeClr val="lt1"/>
+          </a:fontRef>
+        </p:style>
+        <p:txBody>
+          <a:bodyPr rtlCol="0" anchor="ctr"/>
+          <a:lstStyle/>
+          <a:p>
+            <a:pPr algn="ctr"/>
+            <a:endParaRPr lang="LID4096"/>
+          </a:p>
+        </p:txBody>
+      </p:sp>
+      <p:pic>
+        <p:nvPicPr>
+          <p:cNvPr id="18" name="Grafik 17">
+            <a:extLst>
+              <a:ext uri="{FF2B5EF4-FFF2-40B4-BE49-F238E27FC236}">
+                <a16:creationId xmlns:a16="http://schemas.microsoft.com/office/drawing/2014/main" id="{ADAD9063-3050-F634-880E-AFACF127AE79}"/>
+              </a:ext>
+            </a:extLst>
+          </p:cNvPr>
+          <p:cNvPicPr>
+            <a:picLocks noChangeAspect="1"/>
+          </p:cNvPicPr>
+          <p:nvPr/>
+        </p:nvPicPr>
+        <p:blipFill>
+          <a:blip r:embed="rId3"/>
+          <a:stretch>
+            <a:fillRect/>
+          </a:stretch>
+        </p:blipFill>
+        <p:spPr>
+          <a:xfrm>
+            <a:off x="665171" y="4427854"/>
+            <a:ext cx="3503674" cy="1771741"/>
+          </a:xfrm>
+          <a:prstGeom prst="rect">
+            <a:avLst/>
+          </a:prstGeom>
+        </p:spPr>
+      </p:pic>
+      <p:sp>
+        <p:nvSpPr>
+          <p:cNvPr id="21" name="Pfeil: nach rechts 20">
+            <a:extLst>
+              <a:ext uri="{FF2B5EF4-FFF2-40B4-BE49-F238E27FC236}">
+                <a16:creationId xmlns:a16="http://schemas.microsoft.com/office/drawing/2014/main" id="{B4152211-0B79-184A-8627-DA56A13C5DA3}"/>
+              </a:ext>
+            </a:extLst>
+          </p:cNvPr>
+          <p:cNvSpPr/>
+          <p:nvPr/>
+        </p:nvSpPr>
+        <p:spPr>
+          <a:xfrm rot="5400000">
+            <a:off x="1970103" y="3415639"/>
+            <a:ext cx="614135" cy="528933"/>
+          </a:xfrm>
+          <a:prstGeom prst="rightArrow">
+            <a:avLst/>
+          </a:prstGeom>
+        </p:spPr>
+        <p:style>
+          <a:lnRef idx="2">
+            <a:schemeClr val="accent1">
+              <a:shade val="15000"/>
+            </a:schemeClr>
+          </a:lnRef>
+          <a:fillRef idx="1">
+            <a:schemeClr val="accent1"/>
+          </a:fillRef>
+          <a:effectRef idx="0">
+            <a:schemeClr val="accent1"/>
+          </a:effectRef>
+          <a:fontRef idx="minor">
+            <a:schemeClr val="lt1"/>
+          </a:fontRef>
+        </p:style>
+        <p:txBody>
+          <a:bodyPr rtlCol="0" anchor="ctr"/>
+          <a:lstStyle/>
+          <a:p>
+            <a:pPr algn="ctr"/>
+            <a:endParaRPr lang="LID4096" dirty="0"/>
+          </a:p>
+        </p:txBody>
+      </p:sp>
+      <p:pic>
+        <p:nvPicPr>
+          <p:cNvPr id="4" name="Grafik 3">
+            <a:extLst>
+              <a:ext uri="{FF2B5EF4-FFF2-40B4-BE49-F238E27FC236}">
+                <a16:creationId xmlns:a16="http://schemas.microsoft.com/office/drawing/2014/main" id="{6B35B3EC-A4B2-36A5-815E-5A4E934E2AE0}"/>
+              </a:ext>
+            </a:extLst>
+          </p:cNvPr>
+          <p:cNvPicPr>
+            <a:picLocks noChangeAspect="1"/>
+          </p:cNvPicPr>
+          <p:nvPr/>
+        </p:nvPicPr>
+        <p:blipFill>
+          <a:blip r:embed="rId4"/>
+          <a:stretch>
+            <a:fillRect/>
+          </a:stretch>
+        </p:blipFill>
+        <p:spPr>
+          <a:xfrm>
+            <a:off x="5206636" y="1139671"/>
+            <a:ext cx="6047781" cy="2400423"/>
+          </a:xfrm>
+          <a:prstGeom prst="rect">
+            <a:avLst/>
+          </a:prstGeom>
+        </p:spPr>
+      </p:pic>
+      <p:sp>
+        <p:nvSpPr>
+          <p:cNvPr id="7" name="Pfeil: nach rechts 6">
+            <a:extLst>
+              <a:ext uri="{FF2B5EF4-FFF2-40B4-BE49-F238E27FC236}">
+                <a16:creationId xmlns:a16="http://schemas.microsoft.com/office/drawing/2014/main" id="{C361B1F2-BE62-DA8C-5CA6-3E6D5A93CA4F}"/>
+              </a:ext>
+            </a:extLst>
+          </p:cNvPr>
+          <p:cNvSpPr/>
+          <p:nvPr/>
+        </p:nvSpPr>
+        <p:spPr>
+          <a:xfrm rot="5159067">
+            <a:off x="7820622" y="3898921"/>
+            <a:ext cx="409903" cy="528933"/>
+          </a:xfrm>
+          <a:prstGeom prst="rightArrow">
+            <a:avLst/>
+          </a:prstGeom>
+        </p:spPr>
+        <p:style>
+          <a:lnRef idx="2">
+            <a:schemeClr val="accent1">
+              <a:shade val="15000"/>
+            </a:schemeClr>
+          </a:lnRef>
+          <a:fillRef idx="1">
+            <a:schemeClr val="accent1"/>
+          </a:fillRef>
+          <a:effectRef idx="0">
+            <a:schemeClr val="accent1"/>
+          </a:effectRef>
+          <a:fontRef idx="minor">
+            <a:schemeClr val="lt1"/>
+          </a:fontRef>
+        </p:style>
+        <p:txBody>
+          <a:bodyPr rtlCol="0" anchor="ctr"/>
+          <a:lstStyle/>
+          <a:p>
+            <a:pPr algn="ctr"/>
+            <a:endParaRPr lang="LID4096"/>
+          </a:p>
+        </p:txBody>
+      </p:sp>
+      <p:pic>
+        <p:nvPicPr>
+          <p:cNvPr id="3" name="Grafik 2">
+            <a:extLst>
+              <a:ext uri="{FF2B5EF4-FFF2-40B4-BE49-F238E27FC236}">
+                <a16:creationId xmlns:a16="http://schemas.microsoft.com/office/drawing/2014/main" id="{67635E5E-6165-040C-42B5-CFAB807BA6E2}"/>
+              </a:ext>
+            </a:extLst>
+          </p:cNvPr>
+          <p:cNvPicPr>
+            <a:picLocks noChangeAspect="1"/>
+          </p:cNvPicPr>
+          <p:nvPr/>
+        </p:nvPicPr>
+        <p:blipFill>
+          <a:blip r:embed="rId5"/>
+          <a:stretch>
+            <a:fillRect/>
+          </a:stretch>
+        </p:blipFill>
+        <p:spPr>
+          <a:xfrm>
+            <a:off x="4798174" y="4692320"/>
+            <a:ext cx="6864703" cy="1663786"/>
+          </a:xfrm>
+          <a:prstGeom prst="rect">
+            <a:avLst/>
+          </a:prstGeom>
+        </p:spPr>
+      </p:pic>
+    </p:spTree>
+    <p:extLst>
+      <p:ext uri="{BB962C8B-B14F-4D97-AF65-F5344CB8AC3E}">
+        <p14:creationId xmlns:p14="http://schemas.microsoft.com/office/powerpoint/2010/main" val="749014029"/>
+      </p:ext>
+    </p:extLst>
+  </p:cSld>
+  <p:clrMapOvr>
+    <a:masterClrMapping/>
+  </p:clrMapOvr>
+</p:sld>
+</file>
+
+<file path=ppt/slides/slide7.xml><?xml version="1.0" encoding="utf-8"?>
+<p:sld xmlns:a="http://schemas.openxmlformats.org/drawingml/2006/main" xmlns:r="http://schemas.openxmlformats.org/officeDocument/2006/relationships" xmlns:p="http://schemas.openxmlformats.org/presentationml/2006/main">
+  <p:cSld>
+    <p:spTree>
+      <p:nvGrpSpPr>
+        <p:cNvPr id="1" name=""/>
+        <p:cNvGrpSpPr/>
+        <p:nvPr/>
+      </p:nvGrpSpPr>
+      <p:grpSpPr>
+        <a:xfrm>
+          <a:off x="0" y="0"/>
+          <a:ext cx="0" cy="0"/>
+          <a:chOff x="0" y="0"/>
+          <a:chExt cx="0" cy="0"/>
+        </a:xfrm>
+      </p:grpSpPr>
+      <p:sp>
+        <p:nvSpPr>
+          <p:cNvPr id="2" name="Titel 1">
+            <a:extLst>
+              <a:ext uri="{FF2B5EF4-FFF2-40B4-BE49-F238E27FC236}">
+                <a16:creationId xmlns:a16="http://schemas.microsoft.com/office/drawing/2014/main" id="{3A90885E-398E-BE38-AD53-8C04EB50DCE1}"/>
+              </a:ext>
+            </a:extLst>
+          </p:cNvPr>
+          <p:cNvSpPr>
+            <a:spLocks noGrp="1"/>
+          </p:cNvSpPr>
+          <p:nvPr>
+            <p:ph type="title"/>
+          </p:nvPr>
+        </p:nvSpPr>
+        <p:spPr>
+          <a:xfrm>
+            <a:off x="1158240" y="2750820"/>
+            <a:ext cx="9875520" cy="1356360"/>
+          </a:xfrm>
+        </p:spPr>
+        <p:txBody>
+          <a:bodyPr/>
+          <a:lstStyle/>
+          <a:p>
+            <a:pPr algn="ctr"/>
+            <a:r>
+              <a:rPr lang="de-DE" dirty="0"/>
+              <a:t>Umgang mit den lokalen Daten</a:t>
+            </a:r>
+          </a:p>
+        </p:txBody>
+      </p:sp>
+    </p:spTree>
+    <p:extLst>
+      <p:ext uri="{BB962C8B-B14F-4D97-AF65-F5344CB8AC3E}">
+        <p14:creationId xmlns:p14="http://schemas.microsoft.com/office/powerpoint/2010/main" val="4132764493"/>
+      </p:ext>
+    </p:extLst>
+  </p:cSld>
+  <p:clrMapOvr>
+    <a:masterClrMapping/>
+  </p:clrMapOvr>
+</p:sld>
+</file>
+
+<file path=ppt/slides/slide8.xml><?xml version="1.0" encoding="utf-8"?>
+<p:sld xmlns:a="http://schemas.openxmlformats.org/drawingml/2006/main" xmlns:r="http://schemas.openxmlformats.org/officeDocument/2006/relationships" xmlns:p="http://schemas.openxmlformats.org/presentationml/2006/main">
+  <p:cSld>
+    <p:spTree>
+      <p:nvGrpSpPr>
+        <p:cNvPr id="1" name=""/>
+        <p:cNvGrpSpPr/>
+        <p:nvPr/>
+      </p:nvGrpSpPr>
+      <p:grpSpPr>
+        <a:xfrm>
+          <a:off x="0" y="0"/>
+          <a:ext cx="0" cy="0"/>
+          <a:chOff x="0" y="0"/>
+          <a:chExt cx="0" cy="0"/>
+        </a:xfrm>
+      </p:grpSpPr>
+      <p:sp>
+        <p:nvSpPr>
+          <p:cNvPr id="2" name="Titel 1">
+            <a:extLst>
+              <a:ext uri="{FF2B5EF4-FFF2-40B4-BE49-F238E27FC236}">
+                <a16:creationId xmlns:a16="http://schemas.microsoft.com/office/drawing/2014/main" id="{E03116A4-3B66-7E50-7F33-C60DAE9A6D6E}"/>
+              </a:ext>
+            </a:extLst>
+          </p:cNvPr>
+          <p:cNvSpPr>
+            <a:spLocks noGrp="1"/>
+          </p:cNvSpPr>
+          <p:nvPr>
+            <p:ph type="title"/>
+          </p:nvPr>
+        </p:nvSpPr>
+        <p:spPr/>
+        <p:txBody>
+          <a:bodyPr/>
+          <a:lstStyle/>
+          <a:p>
+            <a:r>
+              <a:rPr lang="de-DE" dirty="0" err="1"/>
+              <a:t>Json</a:t>
+            </a:r>
+            <a:r>
+              <a:rPr lang="de-DE" dirty="0"/>
+              <a:t> Format – „</a:t>
+            </a:r>
+            <a:r>
+              <a:rPr lang="de-DE" dirty="0" err="1"/>
+              <a:t>tasks.json</a:t>
+            </a:r>
+            <a:r>
+              <a:rPr lang="de-DE" dirty="0"/>
+              <a:t>“</a:t>
+            </a:r>
+          </a:p>
+        </p:txBody>
+      </p:sp>
+      <p:pic>
+        <p:nvPicPr>
+          <p:cNvPr id="4" name="Grafik 3">
+            <a:extLst>
+              <a:ext uri="{FF2B5EF4-FFF2-40B4-BE49-F238E27FC236}">
+                <a16:creationId xmlns:a16="http://schemas.microsoft.com/office/drawing/2014/main" id="{9EBE9866-A570-613A-FC61-F0FE087F37B0}"/>
+              </a:ext>
+            </a:extLst>
+          </p:cNvPr>
+          <p:cNvPicPr>
+            <a:picLocks noChangeAspect="1"/>
+          </p:cNvPicPr>
+          <p:nvPr/>
+        </p:nvPicPr>
+        <p:blipFill>
+          <a:blip r:embed="rId2"/>
+          <a:stretch>
+            <a:fillRect/>
+          </a:stretch>
+        </p:blipFill>
+        <p:spPr>
+          <a:xfrm>
+            <a:off x="7704448" y="1092387"/>
+            <a:ext cx="3859656" cy="4673224"/>
+          </a:xfrm>
+          <a:prstGeom prst="rect">
+            <a:avLst/>
+          </a:prstGeom>
+        </p:spPr>
+      </p:pic>
+      <p:sp>
+        <p:nvSpPr>
+          <p:cNvPr id="5" name="Textfeld 4">
+            <a:extLst>
+              <a:ext uri="{FF2B5EF4-FFF2-40B4-BE49-F238E27FC236}">
+                <a16:creationId xmlns:a16="http://schemas.microsoft.com/office/drawing/2014/main" id="{8AE19871-AE3C-CD8B-1480-2015DF7B09B4}"/>
+              </a:ext>
+            </a:extLst>
+          </p:cNvPr>
+          <p:cNvSpPr txBox="1"/>
+          <p:nvPr/>
+        </p:nvSpPr>
+        <p:spPr>
+          <a:xfrm>
+            <a:off x="1143000" y="2413337"/>
+            <a:ext cx="4589047" cy="2031325"/>
+          </a:xfrm>
+          <a:prstGeom prst="rect">
+            <a:avLst/>
+          </a:prstGeom>
+          <a:noFill/>
+        </p:spPr>
+        <p:txBody>
+          <a:bodyPr wrap="square" rtlCol="0">
+            <a:spAutoFit/>
+          </a:bodyPr>
+          <a:lstStyle/>
+          <a:p>
+            <a:pPr marL="285750" indent="-285750">
+              <a:buFont typeface="Arial" panose="020B0604020202020204" pitchFamily="34" charset="0"/>
+              <a:buChar char="•"/>
+            </a:pPr>
+            <a:r>
+              <a:rPr lang="de-DE" dirty="0"/>
+              <a:t>„</a:t>
+            </a:r>
+            <a:r>
+              <a:rPr lang="de-DE" dirty="0" err="1"/>
+              <a:t>uuid</a:t>
+            </a:r>
+            <a:r>
+              <a:rPr lang="de-DE" dirty="0"/>
+              <a:t>“ - Eindeutige Identifikation</a:t>
+            </a:r>
+          </a:p>
+          <a:p>
+            <a:pPr marL="285750" indent="-285750">
+              <a:buFont typeface="Arial" panose="020B0604020202020204" pitchFamily="34" charset="0"/>
+              <a:buChar char="•"/>
+            </a:pPr>
+            <a:endParaRPr lang="de-DE" dirty="0"/>
+          </a:p>
+          <a:p>
+            <a:pPr marL="285750" indent="-285750">
+              <a:buFont typeface="Arial" panose="020B0604020202020204" pitchFamily="34" charset="0"/>
+              <a:buChar char="•"/>
+            </a:pPr>
+            <a:r>
+              <a:rPr lang="de-DE" dirty="0"/>
+              <a:t>„client-</a:t>
+            </a:r>
+            <a:r>
+              <a:rPr lang="de-DE" dirty="0" err="1"/>
+              <a:t>id</a:t>
+            </a:r>
+            <a:r>
+              <a:rPr lang="de-DE" dirty="0"/>
+              <a:t>“ - Identifizierung des Erstellers</a:t>
+            </a:r>
+          </a:p>
+          <a:p>
+            <a:pPr marL="285750" indent="-285750">
+              <a:buFont typeface="Arial" panose="020B0604020202020204" pitchFamily="34" charset="0"/>
+              <a:buChar char="•"/>
+            </a:pPr>
+            <a:endParaRPr lang="de-DE" dirty="0"/>
+          </a:p>
+          <a:p>
+            <a:pPr marL="285750" indent="-285750">
+              <a:buFont typeface="Arial" panose="020B0604020202020204" pitchFamily="34" charset="0"/>
+              <a:buChar char="•"/>
+            </a:pPr>
+            <a:r>
+              <a:rPr lang="de-DE" dirty="0"/>
+              <a:t>„</a:t>
+            </a:r>
+            <a:r>
+              <a:rPr lang="de-DE" dirty="0" err="1"/>
+              <a:t>message</a:t>
+            </a:r>
+            <a:r>
+              <a:rPr lang="de-DE" dirty="0"/>
+              <a:t>“ - enthält den Inhalt des </a:t>
+            </a:r>
+            <a:r>
+              <a:rPr lang="de-DE" dirty="0" err="1"/>
+              <a:t>Todo‘s</a:t>
+            </a:r>
+            <a:endParaRPr lang="de-DE" dirty="0"/>
+          </a:p>
+          <a:p>
+            <a:pPr marL="285750" indent="-285750">
+              <a:buFont typeface="Arial" panose="020B0604020202020204" pitchFamily="34" charset="0"/>
+              <a:buChar char="•"/>
+            </a:pPr>
+            <a:endParaRPr lang="de-DE" dirty="0"/>
+          </a:p>
+          <a:p>
+            <a:pPr marL="285750" indent="-285750">
+              <a:buFont typeface="Arial" panose="020B0604020202020204" pitchFamily="34" charset="0"/>
+              <a:buChar char="•"/>
+            </a:pPr>
+            <a:r>
+              <a:rPr lang="de-DE" dirty="0"/>
+              <a:t>„</a:t>
+            </a:r>
+            <a:r>
+              <a:rPr lang="de-DE" dirty="0" err="1"/>
+              <a:t>state</a:t>
+            </a:r>
+            <a:r>
+              <a:rPr lang="de-DE" dirty="0"/>
+              <a:t>“ -  erledigt/nicht erledigt</a:t>
+            </a:r>
+          </a:p>
+        </p:txBody>
+      </p:sp>
+    </p:spTree>
+    <p:extLst>
+      <p:ext uri="{BB962C8B-B14F-4D97-AF65-F5344CB8AC3E}">
+        <p14:creationId xmlns:p14="http://schemas.microsoft.com/office/powerpoint/2010/main" val="4154405935"/>
+      </p:ext>
+    </p:extLst>
+  </p:cSld>
+  <p:clrMapOvr>
+    <a:masterClrMapping/>
+  </p:clrMapOvr>
+</p:sld>
+</file>
+
+<file path=ppt/slides/slide9.xml><?xml version="1.0" encoding="utf-8"?>
+<p:sld xmlns:a="http://schemas.openxmlformats.org/drawingml/2006/main" xmlns:r="http://schemas.openxmlformats.org/officeDocument/2006/relationships" xmlns:p="http://schemas.openxmlformats.org/presentationml/2006/main">
+  <p:cSld>
+    <p:spTree>
+      <p:nvGrpSpPr>
+        <p:cNvPr id="1" name=""/>
+        <p:cNvGrpSpPr/>
+        <p:nvPr/>
+      </p:nvGrpSpPr>
+      <p:grpSpPr>
+        <a:xfrm>
+          <a:off x="0" y="0"/>
+          <a:ext cx="0" cy="0"/>
+          <a:chOff x="0" y="0"/>
+          <a:chExt cx="0" cy="0"/>
+        </a:xfrm>
+      </p:grpSpPr>
+      <p:sp>
+        <p:nvSpPr>
+          <p:cNvPr id="2" name="Titel 1">
+            <a:extLst>
+              <a:ext uri="{FF2B5EF4-FFF2-40B4-BE49-F238E27FC236}">
+                <a16:creationId xmlns:a16="http://schemas.microsoft.com/office/drawing/2014/main" id="{8D059D17-FC61-D6F1-AE82-A2A9AB66B645}"/>
+              </a:ext>
+            </a:extLst>
+          </p:cNvPr>
+          <p:cNvSpPr>
+            <a:spLocks noGrp="1"/>
+          </p:cNvSpPr>
+          <p:nvPr>
+            <p:ph type="title"/>
+          </p:nvPr>
+        </p:nvSpPr>
+        <p:spPr/>
+        <p:txBody>
+          <a:bodyPr/>
+          <a:lstStyle/>
+          <a:p>
+            <a:r>
+              <a:rPr lang="de-DE" dirty="0"/>
+              <a:t>Tasks hinzufügen</a:t>
+            </a:r>
+          </a:p>
+        </p:txBody>
+      </p:sp>
+      <p:sp>
+        <p:nvSpPr>
+          <p:cNvPr id="3" name="Textfeld 2">
+            <a:extLst>
+              <a:ext uri="{FF2B5EF4-FFF2-40B4-BE49-F238E27FC236}">
+                <a16:creationId xmlns:a16="http://schemas.microsoft.com/office/drawing/2014/main" id="{E2A9F9FC-B7EC-AEBF-552B-335B9719D0E5}"/>
+              </a:ext>
+            </a:extLst>
+          </p:cNvPr>
+          <p:cNvSpPr txBox="1"/>
+          <p:nvPr/>
+        </p:nvSpPr>
+        <p:spPr>
+          <a:xfrm>
+            <a:off x="1212980" y="1965960"/>
+            <a:ext cx="3555349" cy="369332"/>
+          </a:xfrm>
+          <a:prstGeom prst="rect">
+            <a:avLst/>
+          </a:prstGeom>
+          <a:noFill/>
+        </p:spPr>
+        <p:txBody>
+          <a:bodyPr wrap="square" rtlCol="0">
+            <a:spAutoFit/>
+          </a:bodyPr>
+          <a:lstStyle/>
+          <a:p>
+            <a:r>
+              <a:rPr lang="de-DE" dirty="0"/>
+              <a:t>Hinzufügen des Tasks</a:t>
+            </a:r>
+          </a:p>
+        </p:txBody>
+      </p:sp>
+      <p:sp>
+        <p:nvSpPr>
+          <p:cNvPr id="6" name="Textfeld 5">
+            <a:extLst>
+              <a:ext uri="{FF2B5EF4-FFF2-40B4-BE49-F238E27FC236}">
+                <a16:creationId xmlns:a16="http://schemas.microsoft.com/office/drawing/2014/main" id="{CE46F5E4-D754-5DAF-79EC-ADFBEA76B5AF}"/>
+              </a:ext>
+            </a:extLst>
+          </p:cNvPr>
+          <p:cNvSpPr txBox="1"/>
+          <p:nvPr/>
+        </p:nvSpPr>
+        <p:spPr>
+          <a:xfrm>
+            <a:off x="1212978" y="2758751"/>
+            <a:ext cx="3666931" cy="646331"/>
+          </a:xfrm>
+          <a:prstGeom prst="rect">
+            <a:avLst/>
+          </a:prstGeom>
+          <a:noFill/>
+        </p:spPr>
+        <p:txBody>
+          <a:bodyPr wrap="square" rtlCol="0">
+            <a:spAutoFit/>
+          </a:bodyPr>
+          <a:lstStyle/>
+          <a:p>
+            <a:r>
+              <a:rPr lang="de-DE" dirty="0"/>
+              <a:t>Öffnen der lokalen „</a:t>
+            </a:r>
+            <a:r>
+              <a:rPr lang="de-DE" dirty="0" err="1"/>
+              <a:t>tasks.json</a:t>
+            </a:r>
+            <a:r>
+              <a:rPr lang="de-DE" dirty="0"/>
+              <a:t>“</a:t>
+            </a:r>
+          </a:p>
+          <a:p>
+            <a:r>
+              <a:rPr lang="de-DE" dirty="0"/>
+              <a:t>&amp; als </a:t>
+            </a:r>
+            <a:r>
+              <a:rPr lang="de-DE" dirty="0" err="1"/>
+              <a:t>dict</a:t>
+            </a:r>
+            <a:r>
+              <a:rPr lang="de-DE" dirty="0"/>
+              <a:t> laden</a:t>
+            </a:r>
+          </a:p>
+        </p:txBody>
+      </p:sp>
+      <p:pic>
+        <p:nvPicPr>
+          <p:cNvPr id="10" name="Grafik 9">
+            <a:extLst>
+              <a:ext uri="{FF2B5EF4-FFF2-40B4-BE49-F238E27FC236}">
+                <a16:creationId xmlns:a16="http://schemas.microsoft.com/office/drawing/2014/main" id="{1D8903AA-ED21-1C77-C8E2-F3AB8BEA64AD}"/>
+              </a:ext>
+            </a:extLst>
+          </p:cNvPr>
+          <p:cNvPicPr>
+            <a:picLocks noChangeAspect="1"/>
+          </p:cNvPicPr>
+          <p:nvPr/>
+        </p:nvPicPr>
+        <p:blipFill rotWithShape="1">
+          <a:blip r:embed="rId2"/>
+          <a:srcRect t="1" b="88344"/>
+          <a:stretch/>
+        </p:blipFill>
+        <p:spPr>
+          <a:xfrm>
+            <a:off x="5015397" y="1965960"/>
+            <a:ext cx="6250191" cy="469641"/>
+          </a:xfrm>
+          <a:prstGeom prst="rect">
+            <a:avLst/>
+          </a:prstGeom>
+        </p:spPr>
+      </p:pic>
+      <p:pic>
+        <p:nvPicPr>
+          <p:cNvPr id="13" name="Grafik 12">
+            <a:extLst>
+              <a:ext uri="{FF2B5EF4-FFF2-40B4-BE49-F238E27FC236}">
+                <a16:creationId xmlns:a16="http://schemas.microsoft.com/office/drawing/2014/main" id="{25706AFD-14A3-14A9-9CAA-08FE42F4BB4B}"/>
+              </a:ext>
+            </a:extLst>
+          </p:cNvPr>
+          <p:cNvPicPr>
+            <a:picLocks noChangeAspect="1"/>
+          </p:cNvPicPr>
+          <p:nvPr/>
+        </p:nvPicPr>
+        <p:blipFill rotWithShape="1">
+          <a:blip r:embed="rId2"/>
+          <a:srcRect t="18285" b="70060"/>
+          <a:stretch/>
+        </p:blipFill>
+        <p:spPr>
+          <a:xfrm>
+            <a:off x="5015397" y="2758751"/>
+            <a:ext cx="6250191" cy="469641"/>
+          </a:xfrm>
+          <a:prstGeom prst="rect">
+            <a:avLst/>
+          </a:prstGeom>
+        </p:spPr>
+      </p:pic>
+      <p:pic>
+        <p:nvPicPr>
+          <p:cNvPr id="14" name="Grafik 13">
+            <a:extLst>
+              <a:ext uri="{FF2B5EF4-FFF2-40B4-BE49-F238E27FC236}">
+                <a16:creationId xmlns:a16="http://schemas.microsoft.com/office/drawing/2014/main" id="{14C163CB-D792-73E0-866F-8CABF2AE5305}"/>
+              </a:ext>
+            </a:extLst>
+          </p:cNvPr>
+          <p:cNvPicPr>
+            <a:picLocks noChangeAspect="1"/>
+          </p:cNvPicPr>
+          <p:nvPr/>
+        </p:nvPicPr>
+        <p:blipFill rotWithShape="1">
+          <a:blip r:embed="rId2"/>
+          <a:srcRect t="33661" b="34168"/>
+          <a:stretch/>
+        </p:blipFill>
+        <p:spPr>
+          <a:xfrm>
+            <a:off x="5015397" y="3322320"/>
+            <a:ext cx="6250191" cy="1296333"/>
+          </a:xfrm>
+          <a:prstGeom prst="rect">
+            <a:avLst/>
+          </a:prstGeom>
+        </p:spPr>
+      </p:pic>
+      <p:sp>
+        <p:nvSpPr>
+          <p:cNvPr id="16" name="Textfeld 15">
+            <a:extLst>
+              <a:ext uri="{FF2B5EF4-FFF2-40B4-BE49-F238E27FC236}">
+                <a16:creationId xmlns:a16="http://schemas.microsoft.com/office/drawing/2014/main" id="{82E5C6AB-2177-D1BD-B416-6CD0ED00C28F}"/>
+              </a:ext>
+            </a:extLst>
+          </p:cNvPr>
+          <p:cNvSpPr txBox="1"/>
+          <p:nvPr/>
+        </p:nvSpPr>
+        <p:spPr>
+          <a:xfrm>
+            <a:off x="1212978" y="3322320"/>
+            <a:ext cx="3666931" cy="369332"/>
+          </a:xfrm>
+          <a:prstGeom prst="rect">
+            <a:avLst/>
+          </a:prstGeom>
+          <a:noFill/>
+        </p:spPr>
+        <p:txBody>
+          <a:bodyPr wrap="square" rtlCol="0">
+            <a:spAutoFit/>
+          </a:bodyPr>
+          <a:lstStyle/>
+          <a:p>
+            <a:r>
+              <a:rPr lang="de-DE" dirty="0"/>
+              <a:t>Erstellen des Tasks Format</a:t>
+            </a:r>
+          </a:p>
+        </p:txBody>
+      </p:sp>
+      <p:pic>
+        <p:nvPicPr>
+          <p:cNvPr id="17" name="Grafik 16">
+            <a:extLst>
+              <a:ext uri="{FF2B5EF4-FFF2-40B4-BE49-F238E27FC236}">
+                <a16:creationId xmlns:a16="http://schemas.microsoft.com/office/drawing/2014/main" id="{D87921E2-CCA0-9B17-C1B2-15F8A535E109}"/>
+              </a:ext>
+            </a:extLst>
+          </p:cNvPr>
+          <p:cNvPicPr>
+            <a:picLocks noChangeAspect="1"/>
+          </p:cNvPicPr>
+          <p:nvPr/>
+        </p:nvPicPr>
+        <p:blipFill rotWithShape="1">
+          <a:blip r:embed="rId2"/>
+          <a:srcRect t="67635" b="15013"/>
+          <a:stretch/>
+        </p:blipFill>
+        <p:spPr>
+          <a:xfrm>
+            <a:off x="5015397" y="4712581"/>
+            <a:ext cx="6250191" cy="699174"/>
+          </a:xfrm>
+          <a:prstGeom prst="rect">
+            <a:avLst/>
+          </a:prstGeom>
+        </p:spPr>
+      </p:pic>
+      <p:sp>
+        <p:nvSpPr>
+          <p:cNvPr id="18" name="Textfeld 17">
+            <a:extLst>
+              <a:ext uri="{FF2B5EF4-FFF2-40B4-BE49-F238E27FC236}">
+                <a16:creationId xmlns:a16="http://schemas.microsoft.com/office/drawing/2014/main" id="{446D033E-A5D0-39AA-4F3E-F288EADB8BAB}"/>
+              </a:ext>
+            </a:extLst>
+          </p:cNvPr>
+          <p:cNvSpPr txBox="1"/>
+          <p:nvPr/>
+        </p:nvSpPr>
+        <p:spPr>
+          <a:xfrm>
+            <a:off x="1212978" y="4707375"/>
+            <a:ext cx="3666931" cy="923330"/>
+          </a:xfrm>
+          <a:prstGeom prst="rect">
+            <a:avLst/>
+          </a:prstGeom>
+          <a:noFill/>
+        </p:spPr>
+        <p:txBody>
+          <a:bodyPr wrap="square" rtlCol="0">
+            <a:spAutoFit/>
+          </a:bodyPr>
+          <a:lstStyle/>
+          <a:p>
+            <a:r>
+              <a:rPr lang="de-DE" dirty="0"/>
+              <a:t>Hinzufügen zu der geladenen List &amp; </a:t>
+            </a:r>
+            <a:r>
+              <a:rPr lang="de-DE" dirty="0" err="1"/>
+              <a:t>aktualiserte</a:t>
+            </a:r>
+            <a:r>
+              <a:rPr lang="de-DE" dirty="0"/>
+              <a:t> Liste der </a:t>
+            </a:r>
+            <a:r>
+              <a:rPr lang="de-DE" dirty="0" err="1"/>
+              <a:t>write</a:t>
+            </a:r>
+            <a:r>
+              <a:rPr lang="de-DE" dirty="0"/>
+              <a:t> Methode übergeben</a:t>
+            </a:r>
+          </a:p>
+        </p:txBody>
+      </p:sp>
+      <p:sp>
+        <p:nvSpPr>
+          <p:cNvPr id="4" name="Textfeld 3">
+            <a:extLst>
+              <a:ext uri="{FF2B5EF4-FFF2-40B4-BE49-F238E27FC236}">
+                <a16:creationId xmlns:a16="http://schemas.microsoft.com/office/drawing/2014/main" id="{62510059-78BB-197E-C018-B02A5CBF1DCC}"/>
+              </a:ext>
+            </a:extLst>
+          </p:cNvPr>
+          <p:cNvSpPr txBox="1"/>
+          <p:nvPr/>
+        </p:nvSpPr>
+        <p:spPr>
+          <a:xfrm>
+            <a:off x="1212977" y="5661497"/>
+            <a:ext cx="3666931" cy="369332"/>
+          </a:xfrm>
+          <a:prstGeom prst="rect">
+            <a:avLst/>
+          </a:prstGeom>
+          <a:noFill/>
+        </p:spPr>
+        <p:txBody>
+          <a:bodyPr wrap="square" rtlCol="0">
+            <a:spAutoFit/>
+          </a:bodyPr>
+          <a:lstStyle/>
+          <a:p>
+            <a:r>
+              <a:rPr lang="de-DE" dirty="0"/>
+              <a:t>Fehlerbehandlung</a:t>
+            </a:r>
+          </a:p>
+        </p:txBody>
+      </p:sp>
+      <p:pic>
+        <p:nvPicPr>
+          <p:cNvPr id="7" name="Grafik 6">
+            <a:extLst>
+              <a:ext uri="{FF2B5EF4-FFF2-40B4-BE49-F238E27FC236}">
+                <a16:creationId xmlns:a16="http://schemas.microsoft.com/office/drawing/2014/main" id="{1B978A36-C077-8616-1332-773E7085205A}"/>
+              </a:ext>
+            </a:extLst>
+          </p:cNvPr>
+          <p:cNvPicPr>
+            <a:picLocks noChangeAspect="1"/>
+          </p:cNvPicPr>
+          <p:nvPr/>
+        </p:nvPicPr>
+        <p:blipFill rotWithShape="1">
+          <a:blip r:embed="rId2"/>
+          <a:srcRect t="11656" b="80325"/>
+          <a:stretch/>
+        </p:blipFill>
+        <p:spPr>
+          <a:xfrm>
+            <a:off x="5015397" y="2435601"/>
+            <a:ext cx="6250191" cy="323150"/>
+          </a:xfrm>
+          <a:prstGeom prst="rect">
+            <a:avLst/>
+          </a:prstGeom>
+        </p:spPr>
+      </p:pic>
+      <p:pic>
+        <p:nvPicPr>
+          <p:cNvPr id="8" name="Grafik 7">
+            <a:extLst>
+              <a:ext uri="{FF2B5EF4-FFF2-40B4-BE49-F238E27FC236}">
+                <a16:creationId xmlns:a16="http://schemas.microsoft.com/office/drawing/2014/main" id="{3C3276A6-2835-12F4-B89E-F8C19D140E8D}"/>
+              </a:ext>
+            </a:extLst>
+          </p:cNvPr>
+          <p:cNvPicPr>
+            <a:picLocks noChangeAspect="1"/>
+          </p:cNvPicPr>
+          <p:nvPr/>
+        </p:nvPicPr>
+        <p:blipFill rotWithShape="1">
+          <a:blip r:embed="rId2"/>
+          <a:srcRect t="86967"/>
+          <a:stretch/>
+        </p:blipFill>
+        <p:spPr>
+          <a:xfrm>
+            <a:off x="5015396" y="5505683"/>
+            <a:ext cx="6250191" cy="525146"/>
+          </a:xfrm>
+          <a:prstGeom prst="rect">
+            <a:avLst/>
+          </a:prstGeom>
+        </p:spPr>
+      </p:pic>
+    </p:spTree>
+    <p:extLst>
+      <p:ext uri="{BB962C8B-B14F-4D97-AF65-F5344CB8AC3E}">
+        <p14:creationId xmlns:p14="http://schemas.microsoft.com/office/powerpoint/2010/main" val="1011116396"/>
+      </p:ext>
+    </p:extLst>
+  </p:cSld>
+  <p:clrMapOvr>
+    <a:masterClrMapping/>
+  </p:clrMapOvr>
+  <p:timing>
+    <p:tnLst>
+      <p:par>
+        <p:cTn id="1" dur="indefinite" restart="never" nodeType="tmRoot">
+          <p:childTnLst>
+            <p:seq concurrent="1" nextAc="seek">
+              <p:cTn id="2" dur="indefinite" nodeType="mainSeq">
+                <p:childTnLst>
+                  <p:par>
+                    <p:cTn id="3" fill="hold">
+                      <p:stCondLst>
+                        <p:cond delay="indefinite"/>
+                      </p:stCondLst>
+                      <p:childTnLst>
+                        <p:par>
+                          <p:cTn id="4" fill="hold">
+                            <p:stCondLst>
+                              <p:cond delay="0"/>
+                            </p:stCondLst>
+                            <p:childTnLst>
+                              <p:par>
+                                <p:cTn id="5" presetID="1" presetClass="entr" presetSubtype="0" fill="hold" grpId="0" nodeType="clickEffect">
+                                  <p:stCondLst>
+                                    <p:cond delay="0"/>
+                                  </p:stCondLst>
+                                  <p:childTnLst>
+                                    <p:set>
+                                      <p:cBhvr>
+                                        <p:cTn id="6" dur="1" fill="hold">
+                                          <p:stCondLst>
+                                            <p:cond delay="0"/>
+                                          </p:stCondLst>
+                                        </p:cTn>
+                                        <p:tgtEl>
+                                          <p:spTgt spid="3"/>
+                                        </p:tgtEl>
+                                        <p:attrNameLst>
+                                          <p:attrName>style.visibility</p:attrName>
+                                        </p:attrNameLst>
+                                      </p:cBhvr>
+                                      <p:to>
+                                        <p:strVal val="visible"/>
+                                      </p:to>
+                                    </p:set>
+                                  </p:childTnLst>
+                                </p:cTn>
+                              </p:par>
+                              <p:par>
+                                <p:cTn id="7" presetID="1" presetClass="entr" presetSubtype="0" fill="hold" nodeType="withEffect">
+                                  <p:stCondLst>
+                                    <p:cond delay="0"/>
+                                  </p:stCondLst>
+                                  <p:childTnLst>
+                                    <p:set>
+                                      <p:cBhvr>
+                                        <p:cTn id="8" dur="1" fill="hold">
+                                          <p:stCondLst>
+                                            <p:cond delay="0"/>
+                                          </p:stCondLst>
+                                        </p:cTn>
+                                        <p:tgtEl>
+                                          <p:spTgt spid="10"/>
+                                        </p:tgtEl>
+                                        <p:attrNameLst>
+                                          <p:attrName>style.visibility</p:attrName>
+                                        </p:attrNameLst>
+                                      </p:cBhvr>
+                                      <p:to>
+                                        <p:strVal val="visible"/>
+                                      </p:to>
+                                    </p:set>
+                                  </p:childTnLst>
+                                </p:cTn>
+                              </p:par>
+                            </p:childTnLst>
+                          </p:cTn>
+                        </p:par>
+                      </p:childTnLst>
+                    </p:cTn>
+                  </p:par>
+                  <p:par>
+                    <p:cTn id="9" fill="hold">
+                      <p:stCondLst>
+                        <p:cond delay="indefinite"/>
+                      </p:stCondLst>
+                      <p:childTnLst>
+                        <p:par>
+                          <p:cTn id="10" fill="hold">
+                            <p:stCondLst>
+                              <p:cond delay="0"/>
+                            </p:stCondLst>
+                            <p:childTnLst>
+                              <p:par>
+                                <p:cTn id="11" presetID="1" presetClass="entr" presetSubtype="0" fill="hold" grpId="0" nodeType="clickEffect">
+                                  <p:stCondLst>
+                                    <p:cond delay="0"/>
+                                  </p:stCondLst>
+                                  <p:childTnLst>
+                                    <p:set>
+                                      <p:cBhvr>
+                                        <p:cTn id="12" dur="1" fill="hold">
+                                          <p:stCondLst>
+                                            <p:cond delay="0"/>
+                                          </p:stCondLst>
+                                        </p:cTn>
+                                        <p:tgtEl>
+                                          <p:spTgt spid="6"/>
+                                        </p:tgtEl>
+                                        <p:attrNameLst>
+                                          <p:attrName>style.visibility</p:attrName>
+                                        </p:attrNameLst>
+                                      </p:cBhvr>
+                                      <p:to>
+                                        <p:strVal val="visible"/>
+                                      </p:to>
+                                    </p:set>
+                                  </p:childTnLst>
+                                </p:cTn>
+                              </p:par>
+                              <p:par>
+                                <p:cTn id="13" presetID="1" presetClass="entr" presetSubtype="0" fill="hold" nodeType="withEffect">
+                                  <p:stCondLst>
+                                    <p:cond delay="0"/>
+                                  </p:stCondLst>
+                                  <p:childTnLst>
+                                    <p:set>
+                                      <p:cBhvr>
+                                        <p:cTn id="14" dur="1" fill="hold">
+                                          <p:stCondLst>
+                                            <p:cond delay="0"/>
+                                          </p:stCondLst>
+                                        </p:cTn>
+                                        <p:tgtEl>
+                                          <p:spTgt spid="13"/>
+                                        </p:tgtEl>
+                                        <p:attrNameLst>
+                                          <p:attrName>style.visibility</p:attrName>
+                                        </p:attrNameLst>
+                                      </p:cBhvr>
+                                      <p:to>
+                                        <p:strVal val="visible"/>
+                                      </p:to>
+                                    </p:set>
+                                  </p:childTnLst>
+                                </p:cTn>
+                              </p:par>
+                            </p:childTnLst>
+                          </p:cTn>
+                        </p:par>
+                      </p:childTnLst>
+                    </p:cTn>
+                  </p:par>
+                  <p:par>
+                    <p:cTn id="15" fill="hold">
+                      <p:stCondLst>
+                        <p:cond delay="indefinite"/>
+                      </p:stCondLst>
+                      <p:childTnLst>
+                        <p:par>
+                          <p:cTn id="16" fill="hold">
+                            <p:stCondLst>
+                              <p:cond delay="0"/>
+                            </p:stCondLst>
+                            <p:childTnLst>
+                              <p:par>
+                                <p:cTn id="17" presetID="1" presetClass="entr" presetSubtype="0" fill="hold" grpId="0" nodeType="clickEffect">
+                                  <p:stCondLst>
+                                    <p:cond delay="0"/>
+                                  </p:stCondLst>
+                                  <p:childTnLst>
+                                    <p:set>
+                                      <p:cBhvr>
+                                        <p:cTn id="18" dur="1" fill="hold">
+                                          <p:stCondLst>
+                                            <p:cond delay="0"/>
+                                          </p:stCondLst>
+                                        </p:cTn>
+                                        <p:tgtEl>
+                                          <p:spTgt spid="16"/>
+                                        </p:tgtEl>
+                                        <p:attrNameLst>
+                                          <p:attrName>style.visibility</p:attrName>
+                                        </p:attrNameLst>
+                                      </p:cBhvr>
+                                      <p:to>
+                                        <p:strVal val="visible"/>
+                                      </p:to>
+                                    </p:set>
+                                  </p:childTnLst>
+                                </p:cTn>
+                              </p:par>
+                              <p:par>
+                                <p:cTn id="19" presetID="1" presetClass="entr" presetSubtype="0" fill="hold" nodeType="withEffect">
+                                  <p:stCondLst>
+                                    <p:cond delay="0"/>
+                                  </p:stCondLst>
+                                  <p:childTnLst>
+                                    <p:set>
+                                      <p:cBhvr>
+                                        <p:cTn id="20" dur="1" fill="hold">
+                                          <p:stCondLst>
+                                            <p:cond delay="0"/>
+                                          </p:stCondLst>
+                                        </p:cTn>
+                                        <p:tgtEl>
+                                          <p:spTgt spid="14"/>
+                                        </p:tgtEl>
+                                        <p:attrNameLst>
+                                          <p:attrName>style.visibility</p:attrName>
+                                        </p:attrNameLst>
+                                      </p:cBhvr>
+                                      <p:to>
+                                        <p:strVal val="visible"/>
+                                      </p:to>
+                                    </p:set>
+                                  </p:childTnLst>
+                                </p:cTn>
+                              </p:par>
+                            </p:childTnLst>
+                          </p:cTn>
+                        </p:par>
+                      </p:childTnLst>
+                    </p:cTn>
+                  </p:par>
+                  <p:par>
+                    <p:cTn id="21" fill="hold">
+                      <p:stCondLst>
+                        <p:cond delay="indefinite"/>
+                      </p:stCondLst>
+                      <p:childTnLst>
+                        <p:par>
+                          <p:cTn id="22" fill="hold">
+                            <p:stCondLst>
+                              <p:cond delay="0"/>
+                            </p:stCondLst>
+                            <p:childTnLst>
+                              <p:par>
+                                <p:cTn id="23" presetID="1" presetClass="entr" presetSubtype="0" fill="hold" grpId="0" nodeType="clickEffect">
+                                  <p:stCondLst>
+                                    <p:cond delay="0"/>
+                                  </p:stCondLst>
+                                  <p:childTnLst>
+                                    <p:set>
+                                      <p:cBhvr>
+                                        <p:cTn id="24" dur="1" fill="hold">
+                                          <p:stCondLst>
+                                            <p:cond delay="0"/>
+                                          </p:stCondLst>
+                                        </p:cTn>
+                                        <p:tgtEl>
+                                          <p:spTgt spid="18"/>
+                                        </p:tgtEl>
+                                        <p:attrNameLst>
+                                          <p:attrName>style.visibility</p:attrName>
+                                        </p:attrNameLst>
+                                      </p:cBhvr>
+                                      <p:to>
+                                        <p:strVal val="visible"/>
+                                      </p:to>
+                                    </p:set>
+                                  </p:childTnLst>
+                                </p:cTn>
+                              </p:par>
+                              <p:par>
+                                <p:cTn id="25" presetID="1" presetClass="entr" presetSubtype="0" fill="hold" nodeType="withEffect">
+                                  <p:stCondLst>
+                                    <p:cond delay="0"/>
+                                  </p:stCondLst>
+                                  <p:childTnLst>
+                                    <p:set>
+                                      <p:cBhvr>
+                                        <p:cTn id="26" dur="1" fill="hold">
+                                          <p:stCondLst>
+                                            <p:cond delay="0"/>
+                                          </p:stCondLst>
+                                        </p:cTn>
+                                        <p:tgtEl>
+                                          <p:spTgt spid="17"/>
+                                        </p:tgtEl>
+                                        <p:attrNameLst>
+                                          <p:attrName>style.visibility</p:attrName>
+                                        </p:attrNameLst>
+                                      </p:cBhvr>
+                                      <p:to>
+                                        <p:strVal val="visible"/>
+                                      </p:to>
+                                    </p:set>
+                                  </p:childTnLst>
+                                </p:cTn>
+                              </p:par>
+                            </p:childTnLst>
+                          </p:cTn>
+                        </p:par>
+                      </p:childTnLst>
+                    </p:cTn>
+                  </p:par>
+                  <p:par>
+                    <p:cTn id="27" fill="hold">
+                      <p:stCondLst>
+                        <p:cond delay="indefinite"/>
+                      </p:stCondLst>
+                      <p:childTnLst>
+                        <p:par>
+                          <p:cTn id="28" fill="hold">
+                            <p:stCondLst>
+                              <p:cond delay="0"/>
+                            </p:stCondLst>
+                            <p:childTnLst>
+                              <p:par>
+                                <p:cTn id="29" presetID="1" presetClass="entr" presetSubtype="0" fill="hold" grpId="0" nodeType="clickEffect">
+                                  <p:stCondLst>
+                                    <p:cond delay="0"/>
+                                  </p:stCondLst>
+                                  <p:childTnLst>
+                                    <p:set>
+                                      <p:cBhvr>
+                                        <p:cTn id="30" dur="1" fill="hold">
+                                          <p:stCondLst>
+                                            <p:cond delay="0"/>
+                                          </p:stCondLst>
+                                        </p:cTn>
+                                        <p:tgtEl>
+                                          <p:spTgt spid="4"/>
+                                        </p:tgtEl>
+                                        <p:attrNameLst>
+                                          <p:attrName>style.visibility</p:attrName>
+                                        </p:attrNameLst>
+                                      </p:cBhvr>
+                                      <p:to>
+                                        <p:strVal val="visible"/>
+                                      </p:to>
+                                    </p:set>
+                                  </p:childTnLst>
+                                </p:cTn>
+                              </p:par>
+                              <p:par>
+                                <p:cTn id="31" presetID="1" presetClass="entr" presetSubtype="0" fill="hold" nodeType="withEffect">
+                                  <p:stCondLst>
+                                    <p:cond delay="0"/>
+                                  </p:stCondLst>
+                                  <p:childTnLst>
+                                    <p:set>
+                                      <p:cBhvr>
+                                        <p:cTn id="32" dur="1" fill="hold">
+                                          <p:stCondLst>
+                                            <p:cond delay="0"/>
+                                          </p:stCondLst>
+                                        </p:cTn>
+                                        <p:tgtEl>
+                                          <p:spTgt spid="7"/>
+                                        </p:tgtEl>
+                                        <p:attrNameLst>
+                                          <p:attrName>style.visibility</p:attrName>
+                                        </p:attrNameLst>
+                                      </p:cBhvr>
+                                      <p:to>
+                                        <p:strVal val="visible"/>
+                                      </p:to>
+                                    </p:set>
+                                  </p:childTnLst>
+                                </p:cTn>
+                              </p:par>
+                              <p:par>
+                                <p:cTn id="33" presetID="1" presetClass="entr" presetSubtype="0" fill="hold" nodeType="withEffect">
+                                  <p:stCondLst>
+                                    <p:cond delay="0"/>
+                                  </p:stCondLst>
+                                  <p:childTnLst>
+                                    <p:set>
+                                      <p:cBhvr>
+                                        <p:cTn id="34" dur="1" fill="hold">
+                                          <p:stCondLst>
+                                            <p:cond delay="0"/>
+                                          </p:stCondLst>
+                                        </p:cTn>
+                                        <p:tgtEl>
+                                          <p:spTgt spid="8"/>
+                                        </p:tgtEl>
+                                        <p:attrNameLst>
+                                          <p:attrName>style.visibility</p:attrName>
+                                        </p:attrNameLst>
+                                      </p:cBhvr>
+                                      <p:to>
+                                        <p:strVal val="visible"/>
+                                      </p:to>
+                                    </p:set>
+                                  </p:childTnLst>
+                                </p:cTn>
+                              </p:par>
+                            </p:childTnLst>
+                          </p:cTn>
+                        </p:par>
+                      </p:childTnLst>
+                    </p:cTn>
+                  </p:par>
+                </p:childTnLst>
+              </p:cTn>
+              <p:prevCondLst>
+                <p:cond evt="onPrev" delay="0">
+                  <p:tgtEl>
+                    <p:sldTgt/>
+                  </p:tgtEl>
+                </p:cond>
+              </p:prevCondLst>
+              <p:nextCondLst>
+                <p:cond evt="onNext" delay="0">
+                  <p:tgtEl>
+                    <p:sldTgt/>
+                  </p:tgtEl>
+                </p:cond>
+              </p:nextCondLst>
+            </p:seq>
+          </p:childTnLst>
+        </p:cTn>
+      </p:par>
+    </p:tnLst>
+    <p:bldLst>
+      <p:bldP spid="3" grpId="0"/>
+      <p:bldP spid="6" grpId="0"/>
+      <p:bldP spid="16" grpId="0"/>
+      <p:bldP spid="18" grpId="0"/>
+      <p:bldP spid="4" grpId="0"/>
+    </p:bldLst>
+  </p:timing>
+</p:sld>
+</file>
+
 <file path=ppt/theme/theme1.xml><?xml version="1.0" encoding="utf-8"?>
 <a:theme xmlns:a="http://schemas.openxmlformats.org/drawingml/2006/main" name="Basis">
   <a:themeElements>

</xml_diff>